<commit_message>
chapter 6 completed, chapter 7 partially completed
</commit_message>
<xml_diff>
--- a/OCP17/JSE17 Migration.pptx
+++ b/OCP17/JSE17 Migration.pptx
@@ -5,7 +5,7 @@
     <p:sldMasterId id="2147483648" r:id="rId1"/>
   </p:sldMasterIdLst>
   <p:notesMasterIdLst>
-    <p:notesMasterId r:id="rId31"/>
+    <p:notesMasterId r:id="rId32"/>
   </p:notesMasterIdLst>
   <p:sldIdLst>
     <p:sldId id="256" r:id="rId2"/>
@@ -37,6 +37,7 @@
     <p:sldId id="283" r:id="rId28"/>
     <p:sldId id="284" r:id="rId29"/>
     <p:sldId id="285" r:id="rId30"/>
+    <p:sldId id="286" r:id="rId31"/>
   </p:sldIdLst>
   <p:sldSz cx="12192000" cy="6858000"/>
   <p:notesSz cx="6858000" cy="9144000"/>
@@ -169,6 +170,7 @@
             <p14:sldId id="283"/>
             <p14:sldId id="284"/>
             <p14:sldId id="285"/>
+            <p14:sldId id="286"/>
           </p14:sldIdLst>
         </p14:section>
       </p14:sectionLst>
@@ -3075,7 +3077,7 @@
           </a:lstStyle>
           <a:p>
             <a:fld id="{9ACA2D73-2532-A640-A667-27AB4D0D333F}" type="datetimeFigureOut">
-              <a:t>25/7/25</a:t>
+              <a:t>2/8/25</a:t>
             </a:fld>
             <a:endParaRPr lang="en-VN"/>
           </a:p>
@@ -5585,6 +5587,113 @@
 </p:notes>
 </file>
 
+<file path=ppt/notesSlides/notesSlide29.xml><?xml version="1.0" encoding="utf-8"?>
+<p:notes xmlns:a="http://schemas.openxmlformats.org/drawingml/2006/main" xmlns:r="http://schemas.openxmlformats.org/officeDocument/2006/relationships" xmlns:p="http://schemas.openxmlformats.org/presentationml/2006/main">
+  <p:cSld>
+    <p:spTree>
+      <p:nvGrpSpPr>
+        <p:cNvPr id="1" name="">
+          <a:extLst>
+            <a:ext uri="{FF2B5EF4-FFF2-40B4-BE49-F238E27FC236}">
+              <a16:creationId xmlns:a16="http://schemas.microsoft.com/office/drawing/2014/main" id="{384293D2-3BD3-F250-3578-BADFE32B5EF9}"/>
+            </a:ext>
+          </a:extLst>
+        </p:cNvPr>
+        <p:cNvGrpSpPr/>
+        <p:nvPr/>
+      </p:nvGrpSpPr>
+      <p:grpSpPr>
+        <a:xfrm>
+          <a:off x="0" y="0"/>
+          <a:ext cx="0" cy="0"/>
+          <a:chOff x="0" y="0"/>
+          <a:chExt cx="0" cy="0"/>
+        </a:xfrm>
+      </p:grpSpPr>
+      <p:sp>
+        <p:nvSpPr>
+          <p:cNvPr id="2" name="Slide Image Placeholder 1">
+            <a:extLst>
+              <a:ext uri="{FF2B5EF4-FFF2-40B4-BE49-F238E27FC236}">
+                <a16:creationId xmlns:a16="http://schemas.microsoft.com/office/drawing/2014/main" id="{DB7F398F-5BA1-963A-9601-5D94B363B4AD}"/>
+              </a:ext>
+            </a:extLst>
+          </p:cNvPr>
+          <p:cNvSpPr>
+            <a:spLocks noGrp="1" noRot="1" noChangeAspect="1"/>
+          </p:cNvSpPr>
+          <p:nvPr>
+            <p:ph type="sldImg"/>
+          </p:nvPr>
+        </p:nvSpPr>
+        <p:spPr/>
+      </p:sp>
+      <p:sp>
+        <p:nvSpPr>
+          <p:cNvPr id="3" name="Notes Placeholder 2">
+            <a:extLst>
+              <a:ext uri="{FF2B5EF4-FFF2-40B4-BE49-F238E27FC236}">
+                <a16:creationId xmlns:a16="http://schemas.microsoft.com/office/drawing/2014/main" id="{AD8C2C2B-D20C-1D97-3F9C-16F99789471F}"/>
+              </a:ext>
+            </a:extLst>
+          </p:cNvPr>
+          <p:cNvSpPr>
+            <a:spLocks noGrp="1"/>
+          </p:cNvSpPr>
+          <p:nvPr>
+            <p:ph type="body" idx="1"/>
+          </p:nvPr>
+        </p:nvSpPr>
+        <p:spPr/>
+        <p:txBody>
+          <a:bodyPr/>
+          <a:lstStyle/>
+          <a:p>
+            <a:endParaRPr lang="en-VN"/>
+          </a:p>
+        </p:txBody>
+      </p:sp>
+      <p:sp>
+        <p:nvSpPr>
+          <p:cNvPr id="4" name="Slide Number Placeholder 3">
+            <a:extLst>
+              <a:ext uri="{FF2B5EF4-FFF2-40B4-BE49-F238E27FC236}">
+                <a16:creationId xmlns:a16="http://schemas.microsoft.com/office/drawing/2014/main" id="{F3F143AD-6F63-FF88-01C3-0E8DDEF683EF}"/>
+              </a:ext>
+            </a:extLst>
+          </p:cNvPr>
+          <p:cNvSpPr>
+            <a:spLocks noGrp="1"/>
+          </p:cNvSpPr>
+          <p:nvPr>
+            <p:ph type="sldNum" sz="quarter" idx="5"/>
+          </p:nvPr>
+        </p:nvSpPr>
+        <p:spPr/>
+        <p:txBody>
+          <a:bodyPr/>
+          <a:lstStyle/>
+          <a:p>
+            <a:fld id="{576FF3D1-0F45-2240-9B47-75654C02E24A}" type="slidenum">
+              <a:t>30</a:t>
+            </a:fld>
+            <a:endParaRPr lang="en-VN"/>
+          </a:p>
+        </p:txBody>
+      </p:sp>
+    </p:spTree>
+    <p:extLst>
+      <p:ext uri="{BB962C8B-B14F-4D97-AF65-F5344CB8AC3E}">
+        <p14:creationId xmlns:p14="http://schemas.microsoft.com/office/powerpoint/2010/main" val="2384740618"/>
+      </p:ext>
+    </p:extLst>
+  </p:cSld>
+  <p:clrMapOvr>
+    <a:masterClrMapping/>
+  </p:clrMapOvr>
+</p:notes>
+</file>
+
 <file path=ppt/notesSlides/notesSlide3.xml><?xml version="1.0" encoding="utf-8"?>
 <p:notes xmlns:a="http://schemas.openxmlformats.org/drawingml/2006/main" xmlns:r="http://schemas.openxmlformats.org/officeDocument/2006/relationships" xmlns:p="http://schemas.openxmlformats.org/presentationml/2006/main">
   <p:cSld>
@@ -6481,7 +6590,7 @@
           <a:p>
             <a:fld id="{BAA8DE05-51EE-4692-B197-877FA1DAAAED}" type="datetimeFigureOut">
               <a:rPr lang="en-US" smtClean="0"/>
-              <a:t>7/25/25</a:t>
+              <a:t>8/2/25</a:t>
             </a:fld>
             <a:endParaRPr lang="en-US"/>
           </a:p>
@@ -6679,7 +6788,7 @@
           <a:p>
             <a:fld id="{BAA8DE05-51EE-4692-B197-877FA1DAAAED}" type="datetimeFigureOut">
               <a:rPr lang="en-US" smtClean="0"/>
-              <a:t>7/25/25</a:t>
+              <a:t>8/2/25</a:t>
             </a:fld>
             <a:endParaRPr lang="en-US"/>
           </a:p>
@@ -6887,7 +6996,7 @@
           <a:p>
             <a:fld id="{BAA8DE05-51EE-4692-B197-877FA1DAAAED}" type="datetimeFigureOut">
               <a:rPr lang="en-US" smtClean="0"/>
-              <a:t>7/25/25</a:t>
+              <a:t>8/2/25</a:t>
             </a:fld>
             <a:endParaRPr lang="en-US"/>
           </a:p>
@@ -7085,7 +7194,7 @@
           <a:p>
             <a:fld id="{BAA8DE05-51EE-4692-B197-877FA1DAAAED}" type="datetimeFigureOut">
               <a:rPr lang="en-US" smtClean="0"/>
-              <a:t>7/25/25</a:t>
+              <a:t>8/2/25</a:t>
             </a:fld>
             <a:endParaRPr lang="en-US"/>
           </a:p>
@@ -7360,7 +7469,7 @@
           <a:p>
             <a:fld id="{BAA8DE05-51EE-4692-B197-877FA1DAAAED}" type="datetimeFigureOut">
               <a:rPr lang="en-US" smtClean="0"/>
-              <a:t>7/25/25</a:t>
+              <a:t>8/2/25</a:t>
             </a:fld>
             <a:endParaRPr lang="en-US"/>
           </a:p>
@@ -7625,7 +7734,7 @@
           <a:p>
             <a:fld id="{BAA8DE05-51EE-4692-B197-877FA1DAAAED}" type="datetimeFigureOut">
               <a:rPr lang="en-US" smtClean="0"/>
-              <a:t>7/25/25</a:t>
+              <a:t>8/2/25</a:t>
             </a:fld>
             <a:endParaRPr lang="en-US"/>
           </a:p>
@@ -8037,7 +8146,7 @@
           <a:p>
             <a:fld id="{BAA8DE05-51EE-4692-B197-877FA1DAAAED}" type="datetimeFigureOut">
               <a:rPr lang="en-US" smtClean="0"/>
-              <a:t>7/25/25</a:t>
+              <a:t>8/2/25</a:t>
             </a:fld>
             <a:endParaRPr lang="en-US"/>
           </a:p>
@@ -8178,7 +8287,7 @@
           <a:p>
             <a:fld id="{BAA8DE05-51EE-4692-B197-877FA1DAAAED}" type="datetimeFigureOut">
               <a:rPr lang="en-US" smtClean="0"/>
-              <a:t>7/25/25</a:t>
+              <a:t>8/2/25</a:t>
             </a:fld>
             <a:endParaRPr lang="en-US"/>
           </a:p>
@@ -8291,7 +8400,7 @@
           <a:p>
             <a:fld id="{BAA8DE05-51EE-4692-B197-877FA1DAAAED}" type="datetimeFigureOut">
               <a:rPr lang="en-US" smtClean="0"/>
-              <a:t>7/25/25</a:t>
+              <a:t>8/2/25</a:t>
             </a:fld>
             <a:endParaRPr lang="en-US"/>
           </a:p>
@@ -8602,7 +8711,7 @@
           <a:p>
             <a:fld id="{BAA8DE05-51EE-4692-B197-877FA1DAAAED}" type="datetimeFigureOut">
               <a:rPr lang="en-US" smtClean="0"/>
-              <a:t>7/25/25</a:t>
+              <a:t>8/2/25</a:t>
             </a:fld>
             <a:endParaRPr lang="en-US"/>
           </a:p>
@@ -8890,7 +8999,7 @@
           <a:p>
             <a:fld id="{BAA8DE05-51EE-4692-B197-877FA1DAAAED}" type="datetimeFigureOut">
               <a:rPr lang="en-US" smtClean="0"/>
-              <a:t>7/25/25</a:t>
+              <a:t>8/2/25</a:t>
             </a:fld>
             <a:endParaRPr lang="en-US"/>
           </a:p>
@@ -9131,7 +9240,7 @@
           <a:p>
             <a:fld id="{BAA8DE05-51EE-4692-B197-877FA1DAAAED}" type="datetimeFigureOut">
               <a:rPr lang="en-US" smtClean="0"/>
-              <a:t>7/25/25</a:t>
+              <a:t>8/2/25</a:t>
             </a:fld>
             <a:endParaRPr lang="en-US"/>
           </a:p>
@@ -17692,8 +17801,8 @@
             <a:chExt cx="2949840" cy="498600"/>
           </a:xfrm>
         </p:grpSpPr>
-        <mc:AlternateContent xmlns:mc="http://schemas.openxmlformats.org/markup-compatibility/2006">
-          <mc:Choice xmlns:p14="http://schemas.microsoft.com/office/powerpoint/2010/main" Requires="p14">
+        <mc:AlternateContent xmlns:mc="http://schemas.openxmlformats.org/markup-compatibility/2006" xmlns:p14="http://schemas.microsoft.com/office/powerpoint/2010/main">
+          <mc:Choice Requires="p14">
             <p:contentPart p14:bwMode="auto" r:id="rId4">
               <p14:nvContentPartPr>
                 <p14:cNvPr id="5" name="Ink 4">
@@ -17712,7 +17821,7 @@
               </p14:xfrm>
             </p:contentPart>
           </mc:Choice>
-          <mc:Fallback>
+          <mc:Fallback xmlns="">
             <p:pic>
               <p:nvPicPr>
                 <p:cNvPr id="5" name="Ink 4">
@@ -17743,8 +17852,8 @@
             </p:pic>
           </mc:Fallback>
         </mc:AlternateContent>
-        <mc:AlternateContent xmlns:mc="http://schemas.openxmlformats.org/markup-compatibility/2006">
-          <mc:Choice xmlns:p14="http://schemas.microsoft.com/office/powerpoint/2010/main" Requires="p14">
+        <mc:AlternateContent xmlns:mc="http://schemas.openxmlformats.org/markup-compatibility/2006" xmlns:p14="http://schemas.microsoft.com/office/powerpoint/2010/main">
+          <mc:Choice Requires="p14">
             <p:contentPart p14:bwMode="auto" r:id="rId6">
               <p14:nvContentPartPr>
                 <p14:cNvPr id="6" name="Ink 5">
@@ -17763,7 +17872,7 @@
               </p14:xfrm>
             </p:contentPart>
           </mc:Choice>
-          <mc:Fallback>
+          <mc:Fallback xmlns="">
             <p:pic>
               <p:nvPicPr>
                 <p:cNvPr id="6" name="Ink 5">
@@ -17794,8 +17903,8 @@
             </p:pic>
           </mc:Fallback>
         </mc:AlternateContent>
-        <mc:AlternateContent xmlns:mc="http://schemas.openxmlformats.org/markup-compatibility/2006">
-          <mc:Choice xmlns:p14="http://schemas.microsoft.com/office/powerpoint/2010/main" Requires="p14">
+        <mc:AlternateContent xmlns:mc="http://schemas.openxmlformats.org/markup-compatibility/2006" xmlns:p14="http://schemas.microsoft.com/office/powerpoint/2010/main">
+          <mc:Choice Requires="p14">
             <p:contentPart p14:bwMode="auto" r:id="rId8">
               <p14:nvContentPartPr>
                 <p14:cNvPr id="7" name="Ink 6">
@@ -17814,7 +17923,7 @@
               </p14:xfrm>
             </p:contentPart>
           </mc:Choice>
-          <mc:Fallback>
+          <mc:Fallback xmlns="">
             <p:pic>
               <p:nvPicPr>
                 <p:cNvPr id="7" name="Ink 6">
@@ -17845,8 +17954,8 @@
             </p:pic>
           </mc:Fallback>
         </mc:AlternateContent>
-        <mc:AlternateContent xmlns:mc="http://schemas.openxmlformats.org/markup-compatibility/2006">
-          <mc:Choice xmlns:p14="http://schemas.microsoft.com/office/powerpoint/2010/main" Requires="p14">
+        <mc:AlternateContent xmlns:mc="http://schemas.openxmlformats.org/markup-compatibility/2006" xmlns:p14="http://schemas.microsoft.com/office/powerpoint/2010/main">
+          <mc:Choice Requires="p14">
             <p:contentPart p14:bwMode="auto" r:id="rId10">
               <p14:nvContentPartPr>
                 <p14:cNvPr id="8" name="Ink 7">
@@ -17865,7 +17974,7 @@
               </p14:xfrm>
             </p:contentPart>
           </mc:Choice>
-          <mc:Fallback>
+          <mc:Fallback xmlns="">
             <p:pic>
               <p:nvPicPr>
                 <p:cNvPr id="8" name="Ink 7">
@@ -17896,8 +18005,8 @@
             </p:pic>
           </mc:Fallback>
         </mc:AlternateContent>
-        <mc:AlternateContent xmlns:mc="http://schemas.openxmlformats.org/markup-compatibility/2006">
-          <mc:Choice xmlns:p14="http://schemas.microsoft.com/office/powerpoint/2010/main" Requires="p14">
+        <mc:AlternateContent xmlns:mc="http://schemas.openxmlformats.org/markup-compatibility/2006" xmlns:p14="http://schemas.microsoft.com/office/powerpoint/2010/main">
+          <mc:Choice Requires="p14">
             <p:contentPart p14:bwMode="auto" r:id="rId12">
               <p14:nvContentPartPr>
                 <p14:cNvPr id="9" name="Ink 8">
@@ -17916,7 +18025,7 @@
               </p14:xfrm>
             </p:contentPart>
           </mc:Choice>
-          <mc:Fallback>
+          <mc:Fallback xmlns="">
             <p:pic>
               <p:nvPicPr>
                 <p:cNvPr id="9" name="Ink 8">
@@ -17947,8 +18056,8 @@
             </p:pic>
           </mc:Fallback>
         </mc:AlternateContent>
-        <mc:AlternateContent xmlns:mc="http://schemas.openxmlformats.org/markup-compatibility/2006">
-          <mc:Choice xmlns:p14="http://schemas.microsoft.com/office/powerpoint/2010/main" Requires="p14">
+        <mc:AlternateContent xmlns:mc="http://schemas.openxmlformats.org/markup-compatibility/2006" xmlns:p14="http://schemas.microsoft.com/office/powerpoint/2010/main">
+          <mc:Choice Requires="p14">
             <p:contentPart p14:bwMode="auto" r:id="rId14">
               <p14:nvContentPartPr>
                 <p14:cNvPr id="10" name="Ink 9">
@@ -17967,7 +18076,7 @@
               </p14:xfrm>
             </p:contentPart>
           </mc:Choice>
-          <mc:Fallback>
+          <mc:Fallback xmlns="">
             <p:pic>
               <p:nvPicPr>
                 <p:cNvPr id="10" name="Ink 9">
@@ -17998,8 +18107,8 @@
             </p:pic>
           </mc:Fallback>
         </mc:AlternateContent>
-        <mc:AlternateContent xmlns:mc="http://schemas.openxmlformats.org/markup-compatibility/2006">
-          <mc:Choice xmlns:p14="http://schemas.microsoft.com/office/powerpoint/2010/main" Requires="p14">
+        <mc:AlternateContent xmlns:mc="http://schemas.openxmlformats.org/markup-compatibility/2006" xmlns:p14="http://schemas.microsoft.com/office/powerpoint/2010/main">
+          <mc:Choice Requires="p14">
             <p:contentPart p14:bwMode="auto" r:id="rId16">
               <p14:nvContentPartPr>
                 <p14:cNvPr id="11" name="Ink 10">
@@ -18018,7 +18127,7 @@
               </p14:xfrm>
             </p:contentPart>
           </mc:Choice>
-          <mc:Fallback>
+          <mc:Fallback xmlns="">
             <p:pic>
               <p:nvPicPr>
                 <p:cNvPr id="11" name="Ink 10">
@@ -18070,8 +18179,8 @@
             <a:chExt cx="2334240" cy="117360"/>
           </a:xfrm>
         </p:grpSpPr>
-        <mc:AlternateContent xmlns:mc="http://schemas.openxmlformats.org/markup-compatibility/2006">
-          <mc:Choice xmlns:p14="http://schemas.microsoft.com/office/powerpoint/2010/main" Requires="p14">
+        <mc:AlternateContent xmlns:mc="http://schemas.openxmlformats.org/markup-compatibility/2006" xmlns:p14="http://schemas.microsoft.com/office/powerpoint/2010/main">
+          <mc:Choice Requires="p14">
             <p:contentPart p14:bwMode="auto" r:id="rId18">
               <p14:nvContentPartPr>
                 <p14:cNvPr id="14" name="Ink 13">
@@ -18090,7 +18199,7 @@
               </p14:xfrm>
             </p:contentPart>
           </mc:Choice>
-          <mc:Fallback>
+          <mc:Fallback xmlns="">
             <p:pic>
               <p:nvPicPr>
                 <p:cNvPr id="14" name="Ink 13">
@@ -18121,8 +18230,8 @@
             </p:pic>
           </mc:Fallback>
         </mc:AlternateContent>
-        <mc:AlternateContent xmlns:mc="http://schemas.openxmlformats.org/markup-compatibility/2006">
-          <mc:Choice xmlns:p14="http://schemas.microsoft.com/office/powerpoint/2010/main" Requires="p14">
+        <mc:AlternateContent xmlns:mc="http://schemas.openxmlformats.org/markup-compatibility/2006" xmlns:p14="http://schemas.microsoft.com/office/powerpoint/2010/main">
+          <mc:Choice Requires="p14">
             <p:contentPart p14:bwMode="auto" r:id="rId20">
               <p14:nvContentPartPr>
                 <p14:cNvPr id="16" name="Ink 15">
@@ -18141,7 +18250,7 @@
               </p14:xfrm>
             </p:contentPart>
           </mc:Choice>
-          <mc:Fallback>
+          <mc:Fallback xmlns="">
             <p:pic>
               <p:nvPicPr>
                 <p:cNvPr id="16" name="Ink 15">
@@ -18193,8 +18302,8 @@
             <a:chExt cx="2944440" cy="47520"/>
           </a:xfrm>
         </p:grpSpPr>
-        <mc:AlternateContent xmlns:mc="http://schemas.openxmlformats.org/markup-compatibility/2006">
-          <mc:Choice xmlns:p14="http://schemas.microsoft.com/office/powerpoint/2010/main" Requires="p14">
+        <mc:AlternateContent xmlns:mc="http://schemas.openxmlformats.org/markup-compatibility/2006" xmlns:p14="http://schemas.microsoft.com/office/powerpoint/2010/main">
+          <mc:Choice Requires="p14">
             <p:contentPart p14:bwMode="auto" r:id="rId22">
               <p14:nvContentPartPr>
                 <p14:cNvPr id="15" name="Ink 14">
@@ -18213,7 +18322,7 @@
               </p14:xfrm>
             </p:contentPart>
           </mc:Choice>
-          <mc:Fallback>
+          <mc:Fallback xmlns="">
             <p:pic>
               <p:nvPicPr>
                 <p:cNvPr id="15" name="Ink 14">
@@ -18244,8 +18353,8 @@
             </p:pic>
           </mc:Fallback>
         </mc:AlternateContent>
-        <mc:AlternateContent xmlns:mc="http://schemas.openxmlformats.org/markup-compatibility/2006">
-          <mc:Choice xmlns:p14="http://schemas.microsoft.com/office/powerpoint/2010/main" Requires="p14">
+        <mc:AlternateContent xmlns:mc="http://schemas.openxmlformats.org/markup-compatibility/2006" xmlns:p14="http://schemas.microsoft.com/office/powerpoint/2010/main">
+          <mc:Choice Requires="p14">
             <p:contentPart p14:bwMode="auto" r:id="rId24">
               <p14:nvContentPartPr>
                 <p14:cNvPr id="17" name="Ink 16">
@@ -18264,7 +18373,7 @@
               </p14:xfrm>
             </p:contentPart>
           </mc:Choice>
-          <mc:Fallback>
+          <mc:Fallback xmlns="">
             <p:pic>
               <p:nvPicPr>
                 <p:cNvPr id="17" name="Ink 16">
@@ -18296,8 +18405,8 @@
           </mc:Fallback>
         </mc:AlternateContent>
       </p:grpSp>
-      <mc:AlternateContent xmlns:mc="http://schemas.openxmlformats.org/markup-compatibility/2006">
-        <mc:Choice xmlns:p14="http://schemas.microsoft.com/office/powerpoint/2010/main" Requires="p14">
+      <mc:AlternateContent xmlns:mc="http://schemas.openxmlformats.org/markup-compatibility/2006" xmlns:p14="http://schemas.microsoft.com/office/powerpoint/2010/main">
+        <mc:Choice Requires="p14">
           <p:contentPart p14:bwMode="auto" r:id="rId26">
             <p14:nvContentPartPr>
               <p14:cNvPr id="18" name="Ink 17">
@@ -18316,7 +18425,7 @@
             </p14:xfrm>
           </p:contentPart>
         </mc:Choice>
-        <mc:Fallback>
+        <mc:Fallback xmlns="">
           <p:pic>
             <p:nvPicPr>
               <p:cNvPr id="18" name="Ink 17">
@@ -18347,8 +18456,8 @@
           </p:pic>
         </mc:Fallback>
       </mc:AlternateContent>
-      <mc:AlternateContent xmlns:mc="http://schemas.openxmlformats.org/markup-compatibility/2006">
-        <mc:Choice xmlns:p14="http://schemas.microsoft.com/office/powerpoint/2010/main" Requires="p14">
+      <mc:AlternateContent xmlns:mc="http://schemas.openxmlformats.org/markup-compatibility/2006" xmlns:p14="http://schemas.microsoft.com/office/powerpoint/2010/main">
+        <mc:Choice Requires="p14">
           <p:contentPart p14:bwMode="auto" r:id="rId28">
             <p14:nvContentPartPr>
               <p14:cNvPr id="23" name="Ink 22">
@@ -18367,7 +18476,7 @@
             </p14:xfrm>
           </p:contentPart>
         </mc:Choice>
-        <mc:Fallback>
+        <mc:Fallback xmlns="">
           <p:pic>
             <p:nvPicPr>
               <p:cNvPr id="23" name="Ink 22">
@@ -18418,8 +18527,8 @@
             <a:chExt cx="2472840" cy="48600"/>
           </a:xfrm>
         </p:grpSpPr>
-        <mc:AlternateContent xmlns:mc="http://schemas.openxmlformats.org/markup-compatibility/2006">
-          <mc:Choice xmlns:p14="http://schemas.microsoft.com/office/powerpoint/2010/main" Requires="p14">
+        <mc:AlternateContent xmlns:mc="http://schemas.openxmlformats.org/markup-compatibility/2006" xmlns:p14="http://schemas.microsoft.com/office/powerpoint/2010/main">
+          <mc:Choice Requires="p14">
             <p:contentPart p14:bwMode="auto" r:id="rId30">
               <p14:nvContentPartPr>
                 <p14:cNvPr id="24" name="Ink 23">
@@ -18438,7 +18547,7 @@
               </p14:xfrm>
             </p:contentPart>
           </mc:Choice>
-          <mc:Fallback>
+          <mc:Fallback xmlns="">
             <p:pic>
               <p:nvPicPr>
                 <p:cNvPr id="24" name="Ink 23">
@@ -18469,8 +18578,8 @@
             </p:pic>
           </mc:Fallback>
         </mc:AlternateContent>
-        <mc:AlternateContent xmlns:mc="http://schemas.openxmlformats.org/markup-compatibility/2006">
-          <mc:Choice xmlns:p14="http://schemas.microsoft.com/office/powerpoint/2010/main" Requires="p14">
+        <mc:AlternateContent xmlns:mc="http://schemas.openxmlformats.org/markup-compatibility/2006" xmlns:p14="http://schemas.microsoft.com/office/powerpoint/2010/main">
+          <mc:Choice Requires="p14">
             <p:contentPart p14:bwMode="auto" r:id="rId32">
               <p14:nvContentPartPr>
                 <p14:cNvPr id="25" name="Ink 24">
@@ -18489,7 +18598,7 @@
               </p14:xfrm>
             </p:contentPart>
           </mc:Choice>
-          <mc:Fallback>
+          <mc:Fallback xmlns="">
             <p:pic>
               <p:nvPicPr>
                 <p:cNvPr id="25" name="Ink 24">
@@ -18521,8 +18630,8 @@
           </mc:Fallback>
         </mc:AlternateContent>
       </p:grpSp>
-      <mc:AlternateContent xmlns:mc="http://schemas.openxmlformats.org/markup-compatibility/2006">
-        <mc:Choice xmlns:p14="http://schemas.microsoft.com/office/powerpoint/2010/main" Requires="p14">
+      <mc:AlternateContent xmlns:mc="http://schemas.openxmlformats.org/markup-compatibility/2006" xmlns:p14="http://schemas.microsoft.com/office/powerpoint/2010/main">
+        <mc:Choice Requires="p14">
           <p:contentPart p14:bwMode="auto" r:id="rId34">
             <p14:nvContentPartPr>
               <p14:cNvPr id="26" name="Ink 25">
@@ -18541,7 +18650,7 @@
             </p14:xfrm>
           </p:contentPart>
         </mc:Choice>
-        <mc:Fallback>
+        <mc:Fallback xmlns="">
           <p:pic>
             <p:nvPicPr>
               <p:cNvPr id="26" name="Ink 25">
@@ -18572,8 +18681,8 @@
           </p:pic>
         </mc:Fallback>
       </mc:AlternateContent>
-      <mc:AlternateContent xmlns:mc="http://schemas.openxmlformats.org/markup-compatibility/2006">
-        <mc:Choice xmlns:p14="http://schemas.microsoft.com/office/powerpoint/2010/main" Requires="p14">
+      <mc:AlternateContent xmlns:mc="http://schemas.openxmlformats.org/markup-compatibility/2006" xmlns:p14="http://schemas.microsoft.com/office/powerpoint/2010/main">
+        <mc:Choice Requires="p14">
           <p:contentPart p14:bwMode="auto" r:id="rId36">
             <p14:nvContentPartPr>
               <p14:cNvPr id="29" name="Ink 28">
@@ -18592,7 +18701,7 @@
             </p14:xfrm>
           </p:contentPart>
         </mc:Choice>
-        <mc:Fallback>
+        <mc:Fallback xmlns="">
           <p:pic>
             <p:nvPicPr>
               <p:cNvPr id="29" name="Ink 28">
@@ -18623,8 +18732,8 @@
           </p:pic>
         </mc:Fallback>
       </mc:AlternateContent>
-      <mc:AlternateContent xmlns:mc="http://schemas.openxmlformats.org/markup-compatibility/2006">
-        <mc:Choice xmlns:p14="http://schemas.microsoft.com/office/powerpoint/2010/main" Requires="p14">
+      <mc:AlternateContent xmlns:mc="http://schemas.openxmlformats.org/markup-compatibility/2006" xmlns:p14="http://schemas.microsoft.com/office/powerpoint/2010/main">
+        <mc:Choice Requires="p14">
           <p:contentPart p14:bwMode="auto" r:id="rId38">
             <p14:nvContentPartPr>
               <p14:cNvPr id="32" name="Ink 31">
@@ -18643,7 +18752,7 @@
             </p14:xfrm>
           </p:contentPart>
         </mc:Choice>
-        <mc:Fallback>
+        <mc:Fallback xmlns="">
           <p:pic>
             <p:nvPicPr>
               <p:cNvPr id="32" name="Ink 31">
@@ -18694,8 +18803,8 @@
             <a:chExt cx="2698200" cy="97920"/>
           </a:xfrm>
         </p:grpSpPr>
-        <mc:AlternateContent xmlns:mc="http://schemas.openxmlformats.org/markup-compatibility/2006">
-          <mc:Choice xmlns:p14="http://schemas.microsoft.com/office/powerpoint/2010/main" Requires="p14">
+        <mc:AlternateContent xmlns:mc="http://schemas.openxmlformats.org/markup-compatibility/2006" xmlns:p14="http://schemas.microsoft.com/office/powerpoint/2010/main">
+          <mc:Choice Requires="p14">
             <p:contentPart p14:bwMode="auto" r:id="rId40">
               <p14:nvContentPartPr>
                 <p14:cNvPr id="30" name="Ink 29">
@@ -18714,7 +18823,7 @@
               </p14:xfrm>
             </p:contentPart>
           </mc:Choice>
-          <mc:Fallback>
+          <mc:Fallback xmlns="">
             <p:pic>
               <p:nvPicPr>
                 <p:cNvPr id="30" name="Ink 29">
@@ -18745,8 +18854,8 @@
             </p:pic>
           </mc:Fallback>
         </mc:AlternateContent>
-        <mc:AlternateContent xmlns:mc="http://schemas.openxmlformats.org/markup-compatibility/2006">
-          <mc:Choice xmlns:p14="http://schemas.microsoft.com/office/powerpoint/2010/main" Requires="p14">
+        <mc:AlternateContent xmlns:mc="http://schemas.openxmlformats.org/markup-compatibility/2006" xmlns:p14="http://schemas.microsoft.com/office/powerpoint/2010/main">
+          <mc:Choice Requires="p14">
             <p:contentPart p14:bwMode="auto" r:id="rId42">
               <p14:nvContentPartPr>
                 <p14:cNvPr id="31" name="Ink 30">
@@ -18765,7 +18874,7 @@
               </p14:xfrm>
             </p:contentPart>
           </mc:Choice>
-          <mc:Fallback>
+          <mc:Fallback xmlns="">
             <p:pic>
               <p:nvPicPr>
                 <p:cNvPr id="31" name="Ink 30">
@@ -18796,8 +18905,8 @@
             </p:pic>
           </mc:Fallback>
         </mc:AlternateContent>
-        <mc:AlternateContent xmlns:mc="http://schemas.openxmlformats.org/markup-compatibility/2006">
-          <mc:Choice xmlns:p14="http://schemas.microsoft.com/office/powerpoint/2010/main" Requires="p14">
+        <mc:AlternateContent xmlns:mc="http://schemas.openxmlformats.org/markup-compatibility/2006" xmlns:p14="http://schemas.microsoft.com/office/powerpoint/2010/main">
+          <mc:Choice Requires="p14">
             <p:contentPart p14:bwMode="auto" r:id="rId44">
               <p14:nvContentPartPr>
                 <p14:cNvPr id="33" name="Ink 32">
@@ -18816,7 +18925,7 @@
               </p14:xfrm>
             </p:contentPart>
           </mc:Choice>
-          <mc:Fallback>
+          <mc:Fallback xmlns="">
             <p:pic>
               <p:nvPicPr>
                 <p:cNvPr id="33" name="Ink 32">
@@ -22731,8 +22840,8 @@
           </a:prstGeom>
         </p:spPr>
       </p:pic>
-      <mc:AlternateContent xmlns:mc="http://schemas.openxmlformats.org/markup-compatibility/2006">
-        <mc:Choice xmlns:p14="http://schemas.microsoft.com/office/powerpoint/2010/main" Requires="p14">
+      <mc:AlternateContent xmlns:mc="http://schemas.openxmlformats.org/markup-compatibility/2006" xmlns:p14="http://schemas.microsoft.com/office/powerpoint/2010/main">
+        <mc:Choice Requires="p14">
           <p:contentPart p14:bwMode="auto" r:id="rId4">
             <p14:nvContentPartPr>
               <p14:cNvPr id="6" name="Ink 5">
@@ -22751,7 +22860,7 @@
             </p14:xfrm>
           </p:contentPart>
         </mc:Choice>
-        <mc:Fallback>
+        <mc:Fallback xmlns="">
           <p:pic>
             <p:nvPicPr>
               <p:cNvPr id="6" name="Ink 5">
@@ -22782,8 +22891,8 @@
           </p:pic>
         </mc:Fallback>
       </mc:AlternateContent>
-      <mc:AlternateContent xmlns:mc="http://schemas.openxmlformats.org/markup-compatibility/2006">
-        <mc:Choice xmlns:p14="http://schemas.microsoft.com/office/powerpoint/2010/main" Requires="p14">
+      <mc:AlternateContent xmlns:mc="http://schemas.openxmlformats.org/markup-compatibility/2006" xmlns:p14="http://schemas.microsoft.com/office/powerpoint/2010/main">
+        <mc:Choice Requires="p14">
           <p:contentPart p14:bwMode="auto" r:id="rId6">
             <p14:nvContentPartPr>
               <p14:cNvPr id="7" name="Ink 6">
@@ -22802,7 +22911,7 @@
             </p14:xfrm>
           </p:contentPart>
         </mc:Choice>
-        <mc:Fallback>
+        <mc:Fallback xmlns="">
           <p:pic>
             <p:nvPicPr>
               <p:cNvPr id="7" name="Ink 6">
@@ -22833,8 +22942,8 @@
           </p:pic>
         </mc:Fallback>
       </mc:AlternateContent>
-      <mc:AlternateContent xmlns:mc="http://schemas.openxmlformats.org/markup-compatibility/2006">
-        <mc:Choice xmlns:p14="http://schemas.microsoft.com/office/powerpoint/2010/main" Requires="p14">
+      <mc:AlternateContent xmlns:mc="http://schemas.openxmlformats.org/markup-compatibility/2006" xmlns:p14="http://schemas.microsoft.com/office/powerpoint/2010/main">
+        <mc:Choice Requires="p14">
           <p:contentPart p14:bwMode="auto" r:id="rId8">
             <p14:nvContentPartPr>
               <p14:cNvPr id="8" name="Ink 7">
@@ -22853,7 +22962,7 @@
             </p14:xfrm>
           </p:contentPart>
         </mc:Choice>
-        <mc:Fallback>
+        <mc:Fallback xmlns="">
           <p:pic>
             <p:nvPicPr>
               <p:cNvPr id="8" name="Ink 7">
@@ -22884,8 +22993,8 @@
           </p:pic>
         </mc:Fallback>
       </mc:AlternateContent>
-      <mc:AlternateContent xmlns:mc="http://schemas.openxmlformats.org/markup-compatibility/2006">
-        <mc:Choice xmlns:p14="http://schemas.microsoft.com/office/powerpoint/2010/main" Requires="p14">
+      <mc:AlternateContent xmlns:mc="http://schemas.openxmlformats.org/markup-compatibility/2006" xmlns:p14="http://schemas.microsoft.com/office/powerpoint/2010/main">
+        <mc:Choice Requires="p14">
           <p:contentPart p14:bwMode="auto" r:id="rId10">
             <p14:nvContentPartPr>
               <p14:cNvPr id="9" name="Ink 8">
@@ -22904,7 +23013,7 @@
             </p14:xfrm>
           </p:contentPart>
         </mc:Choice>
-        <mc:Fallback>
+        <mc:Fallback xmlns="">
           <p:pic>
             <p:nvPicPr>
               <p:cNvPr id="9" name="Ink 8">
@@ -22935,8 +23044,8 @@
           </p:pic>
         </mc:Fallback>
       </mc:AlternateContent>
-      <mc:AlternateContent xmlns:mc="http://schemas.openxmlformats.org/markup-compatibility/2006">
-        <mc:Choice xmlns:p14="http://schemas.microsoft.com/office/powerpoint/2010/main" Requires="p14">
+      <mc:AlternateContent xmlns:mc="http://schemas.openxmlformats.org/markup-compatibility/2006" xmlns:p14="http://schemas.microsoft.com/office/powerpoint/2010/main">
+        <mc:Choice Requires="p14">
           <p:contentPart p14:bwMode="auto" r:id="rId12">
             <p14:nvContentPartPr>
               <p14:cNvPr id="10" name="Ink 9">
@@ -22955,7 +23064,7 @@
             </p14:xfrm>
           </p:contentPart>
         </mc:Choice>
-        <mc:Fallback>
+        <mc:Fallback xmlns="">
           <p:pic>
             <p:nvPicPr>
               <p:cNvPr id="10" name="Ink 9">
@@ -22986,8 +23095,8 @@
           </p:pic>
         </mc:Fallback>
       </mc:AlternateContent>
-      <mc:AlternateContent xmlns:mc="http://schemas.openxmlformats.org/markup-compatibility/2006">
-        <mc:Choice xmlns:p14="http://schemas.microsoft.com/office/powerpoint/2010/main" Requires="p14">
+      <mc:AlternateContent xmlns:mc="http://schemas.openxmlformats.org/markup-compatibility/2006" xmlns:p14="http://schemas.microsoft.com/office/powerpoint/2010/main">
+        <mc:Choice Requires="p14">
           <p:contentPart p14:bwMode="auto" r:id="rId14">
             <p14:nvContentPartPr>
               <p14:cNvPr id="11" name="Ink 10">
@@ -23006,7 +23115,7 @@
             </p14:xfrm>
           </p:contentPart>
         </mc:Choice>
-        <mc:Fallback>
+        <mc:Fallback xmlns="">
           <p:pic>
             <p:nvPicPr>
               <p:cNvPr id="11" name="Ink 10">
@@ -23037,8 +23146,8 @@
           </p:pic>
         </mc:Fallback>
       </mc:AlternateContent>
-      <mc:AlternateContent xmlns:mc="http://schemas.openxmlformats.org/markup-compatibility/2006">
-        <mc:Choice xmlns:p14="http://schemas.microsoft.com/office/powerpoint/2010/main" Requires="p14">
+      <mc:AlternateContent xmlns:mc="http://schemas.openxmlformats.org/markup-compatibility/2006" xmlns:p14="http://schemas.microsoft.com/office/powerpoint/2010/main">
+        <mc:Choice Requires="p14">
           <p:contentPart p14:bwMode="auto" r:id="rId16">
             <p14:nvContentPartPr>
               <p14:cNvPr id="12" name="Ink 11">
@@ -23057,7 +23166,7 @@
             </p14:xfrm>
           </p:contentPart>
         </mc:Choice>
-        <mc:Fallback>
+        <mc:Fallback xmlns="">
           <p:pic>
             <p:nvPicPr>
               <p:cNvPr id="12" name="Ink 11">
@@ -23088,8 +23197,8 @@
           </p:pic>
         </mc:Fallback>
       </mc:AlternateContent>
-      <mc:AlternateContent xmlns:mc="http://schemas.openxmlformats.org/markup-compatibility/2006">
-        <mc:Choice xmlns:p14="http://schemas.microsoft.com/office/powerpoint/2010/main" Requires="p14">
+      <mc:AlternateContent xmlns:mc="http://schemas.openxmlformats.org/markup-compatibility/2006" xmlns:p14="http://schemas.microsoft.com/office/powerpoint/2010/main">
+        <mc:Choice Requires="p14">
           <p:contentPart p14:bwMode="auto" r:id="rId18">
             <p14:nvContentPartPr>
               <p14:cNvPr id="13" name="Ink 12">
@@ -23108,7 +23217,7 @@
             </p14:xfrm>
           </p:contentPart>
         </mc:Choice>
-        <mc:Fallback>
+        <mc:Fallback xmlns="">
           <p:pic>
             <p:nvPicPr>
               <p:cNvPr id="13" name="Ink 12">
@@ -23139,8 +23248,8 @@
           </p:pic>
         </mc:Fallback>
       </mc:AlternateContent>
-      <mc:AlternateContent xmlns:mc="http://schemas.openxmlformats.org/markup-compatibility/2006">
-        <mc:Choice xmlns:p14="http://schemas.microsoft.com/office/powerpoint/2010/main" Requires="p14">
+      <mc:AlternateContent xmlns:mc="http://schemas.openxmlformats.org/markup-compatibility/2006" xmlns:p14="http://schemas.microsoft.com/office/powerpoint/2010/main">
+        <mc:Choice Requires="p14">
           <p:contentPart p14:bwMode="auto" r:id="rId20">
             <p14:nvContentPartPr>
               <p14:cNvPr id="14" name="Ink 13">
@@ -23159,7 +23268,7 @@
             </p14:xfrm>
           </p:contentPart>
         </mc:Choice>
-        <mc:Fallback>
+        <mc:Fallback xmlns="">
           <p:pic>
             <p:nvPicPr>
               <p:cNvPr id="14" name="Ink 13">
@@ -23190,8 +23299,8 @@
           </p:pic>
         </mc:Fallback>
       </mc:AlternateContent>
-      <mc:AlternateContent xmlns:mc="http://schemas.openxmlformats.org/markup-compatibility/2006">
-        <mc:Choice xmlns:p14="http://schemas.microsoft.com/office/powerpoint/2010/main" Requires="p14">
+      <mc:AlternateContent xmlns:mc="http://schemas.openxmlformats.org/markup-compatibility/2006" xmlns:p14="http://schemas.microsoft.com/office/powerpoint/2010/main">
+        <mc:Choice Requires="p14">
           <p:contentPart p14:bwMode="auto" r:id="rId22">
             <p14:nvContentPartPr>
               <p14:cNvPr id="15" name="Ink 14">
@@ -23210,7 +23319,7 @@
             </p14:xfrm>
           </p:contentPart>
         </mc:Choice>
-        <mc:Fallback>
+        <mc:Fallback xmlns="">
           <p:pic>
             <p:nvPicPr>
               <p:cNvPr id="15" name="Ink 14">
@@ -23241,8 +23350,8 @@
           </p:pic>
         </mc:Fallback>
       </mc:AlternateContent>
-      <mc:AlternateContent xmlns:mc="http://schemas.openxmlformats.org/markup-compatibility/2006">
-        <mc:Choice xmlns:p14="http://schemas.microsoft.com/office/powerpoint/2010/main" Requires="p14">
+      <mc:AlternateContent xmlns:mc="http://schemas.openxmlformats.org/markup-compatibility/2006" xmlns:p14="http://schemas.microsoft.com/office/powerpoint/2010/main">
+        <mc:Choice Requires="p14">
           <p:contentPart p14:bwMode="auto" r:id="rId24">
             <p14:nvContentPartPr>
               <p14:cNvPr id="16" name="Ink 15">
@@ -23261,7 +23370,7 @@
             </p14:xfrm>
           </p:contentPart>
         </mc:Choice>
-        <mc:Fallback>
+        <mc:Fallback xmlns="">
           <p:pic>
             <p:nvPicPr>
               <p:cNvPr id="16" name="Ink 15">
@@ -23292,8 +23401,8 @@
           </p:pic>
         </mc:Fallback>
       </mc:AlternateContent>
-      <mc:AlternateContent xmlns:mc="http://schemas.openxmlformats.org/markup-compatibility/2006">
-        <mc:Choice xmlns:p14="http://schemas.microsoft.com/office/powerpoint/2010/main" Requires="p14">
+      <mc:AlternateContent xmlns:mc="http://schemas.openxmlformats.org/markup-compatibility/2006" xmlns:p14="http://schemas.microsoft.com/office/powerpoint/2010/main">
+        <mc:Choice Requires="p14">
           <p:contentPart p14:bwMode="auto" r:id="rId26">
             <p14:nvContentPartPr>
               <p14:cNvPr id="17" name="Ink 16">
@@ -23312,7 +23421,7 @@
             </p14:xfrm>
           </p:contentPart>
         </mc:Choice>
-        <mc:Fallback>
+        <mc:Fallback xmlns="">
           <p:pic>
             <p:nvPicPr>
               <p:cNvPr id="17" name="Ink 16">
@@ -23343,8 +23452,8 @@
           </p:pic>
         </mc:Fallback>
       </mc:AlternateContent>
-      <mc:AlternateContent xmlns:mc="http://schemas.openxmlformats.org/markup-compatibility/2006">
-        <mc:Choice xmlns:p14="http://schemas.microsoft.com/office/powerpoint/2010/main" Requires="p14">
+      <mc:AlternateContent xmlns:mc="http://schemas.openxmlformats.org/markup-compatibility/2006" xmlns:p14="http://schemas.microsoft.com/office/powerpoint/2010/main">
+        <mc:Choice Requires="p14">
           <p:contentPart p14:bwMode="auto" r:id="rId28">
             <p14:nvContentPartPr>
               <p14:cNvPr id="18" name="Ink 17">
@@ -23363,7 +23472,7 @@
             </p14:xfrm>
           </p:contentPart>
         </mc:Choice>
-        <mc:Fallback>
+        <mc:Fallback xmlns="">
           <p:pic>
             <p:nvPicPr>
               <p:cNvPr id="18" name="Ink 17">
@@ -23394,8 +23503,8 @@
           </p:pic>
         </mc:Fallback>
       </mc:AlternateContent>
-      <mc:AlternateContent xmlns:mc="http://schemas.openxmlformats.org/markup-compatibility/2006">
-        <mc:Choice xmlns:p14="http://schemas.microsoft.com/office/powerpoint/2010/main" Requires="p14">
+      <mc:AlternateContent xmlns:mc="http://schemas.openxmlformats.org/markup-compatibility/2006" xmlns:p14="http://schemas.microsoft.com/office/powerpoint/2010/main">
+        <mc:Choice Requires="p14">
           <p:contentPart p14:bwMode="auto" r:id="rId30">
             <p14:nvContentPartPr>
               <p14:cNvPr id="19" name="Ink 18">
@@ -23414,7 +23523,7 @@
             </p14:xfrm>
           </p:contentPart>
         </mc:Choice>
-        <mc:Fallback>
+        <mc:Fallback xmlns="">
           <p:pic>
             <p:nvPicPr>
               <p:cNvPr id="19" name="Ink 18">
@@ -23445,8 +23554,8 @@
           </p:pic>
         </mc:Fallback>
       </mc:AlternateContent>
-      <mc:AlternateContent xmlns:mc="http://schemas.openxmlformats.org/markup-compatibility/2006">
-        <mc:Choice xmlns:p14="http://schemas.microsoft.com/office/powerpoint/2010/main" Requires="p14">
+      <mc:AlternateContent xmlns:mc="http://schemas.openxmlformats.org/markup-compatibility/2006" xmlns:p14="http://schemas.microsoft.com/office/powerpoint/2010/main">
+        <mc:Choice Requires="p14">
           <p:contentPart p14:bwMode="auto" r:id="rId32">
             <p14:nvContentPartPr>
               <p14:cNvPr id="20" name="Ink 19">
@@ -23465,7 +23574,7 @@
             </p14:xfrm>
           </p:contentPart>
         </mc:Choice>
-        <mc:Fallback>
+        <mc:Fallback xmlns="">
           <p:pic>
             <p:nvPicPr>
               <p:cNvPr id="20" name="Ink 19">
@@ -23496,8 +23605,8 @@
           </p:pic>
         </mc:Fallback>
       </mc:AlternateContent>
-      <mc:AlternateContent xmlns:mc="http://schemas.openxmlformats.org/markup-compatibility/2006">
-        <mc:Choice xmlns:p14="http://schemas.microsoft.com/office/powerpoint/2010/main" Requires="p14">
+      <mc:AlternateContent xmlns:mc="http://schemas.openxmlformats.org/markup-compatibility/2006" xmlns:p14="http://schemas.microsoft.com/office/powerpoint/2010/main">
+        <mc:Choice Requires="p14">
           <p:contentPart p14:bwMode="auto" r:id="rId34">
             <p14:nvContentPartPr>
               <p14:cNvPr id="21" name="Ink 20">
@@ -23516,7 +23625,7 @@
             </p14:xfrm>
           </p:contentPart>
         </mc:Choice>
-        <mc:Fallback>
+        <mc:Fallback xmlns="">
           <p:pic>
             <p:nvPicPr>
               <p:cNvPr id="21" name="Ink 20">
@@ -23547,8 +23656,8 @@
           </p:pic>
         </mc:Fallback>
       </mc:AlternateContent>
-      <mc:AlternateContent xmlns:mc="http://schemas.openxmlformats.org/markup-compatibility/2006">
-        <mc:Choice xmlns:p14="http://schemas.microsoft.com/office/powerpoint/2010/main" Requires="p14">
+      <mc:AlternateContent xmlns:mc="http://schemas.openxmlformats.org/markup-compatibility/2006" xmlns:p14="http://schemas.microsoft.com/office/powerpoint/2010/main">
+        <mc:Choice Requires="p14">
           <p:contentPart p14:bwMode="auto" r:id="rId36">
             <p14:nvContentPartPr>
               <p14:cNvPr id="22" name="Ink 21">
@@ -23567,7 +23676,7 @@
             </p14:xfrm>
           </p:contentPart>
         </mc:Choice>
-        <mc:Fallback>
+        <mc:Fallback xmlns="">
           <p:pic>
             <p:nvPicPr>
               <p:cNvPr id="22" name="Ink 21">
@@ -23598,8 +23707,8 @@
           </p:pic>
         </mc:Fallback>
       </mc:AlternateContent>
-      <mc:AlternateContent xmlns:mc="http://schemas.openxmlformats.org/markup-compatibility/2006">
-        <mc:Choice xmlns:p14="http://schemas.microsoft.com/office/powerpoint/2010/main" Requires="p14">
+      <mc:AlternateContent xmlns:mc="http://schemas.openxmlformats.org/markup-compatibility/2006" xmlns:p14="http://schemas.microsoft.com/office/powerpoint/2010/main">
+        <mc:Choice Requires="p14">
           <p:contentPart p14:bwMode="auto" r:id="rId38">
             <p14:nvContentPartPr>
               <p14:cNvPr id="23" name="Ink 22">
@@ -23618,7 +23727,7 @@
             </p14:xfrm>
           </p:contentPart>
         </mc:Choice>
-        <mc:Fallback>
+        <mc:Fallback xmlns="">
           <p:pic>
             <p:nvPicPr>
               <p:cNvPr id="23" name="Ink 22">
@@ -23649,8 +23758,8 @@
           </p:pic>
         </mc:Fallback>
       </mc:AlternateContent>
-      <mc:AlternateContent xmlns:mc="http://schemas.openxmlformats.org/markup-compatibility/2006">
-        <mc:Choice xmlns:p14="http://schemas.microsoft.com/office/powerpoint/2010/main" Requires="p14">
+      <mc:AlternateContent xmlns:mc="http://schemas.openxmlformats.org/markup-compatibility/2006" xmlns:p14="http://schemas.microsoft.com/office/powerpoint/2010/main">
+        <mc:Choice Requires="p14">
           <p:contentPart p14:bwMode="auto" r:id="rId40">
             <p14:nvContentPartPr>
               <p14:cNvPr id="24" name="Ink 23">
@@ -23669,7 +23778,7 @@
             </p14:xfrm>
           </p:contentPart>
         </mc:Choice>
-        <mc:Fallback>
+        <mc:Fallback xmlns="">
           <p:pic>
             <p:nvPicPr>
               <p:cNvPr id="24" name="Ink 23">
@@ -23700,8 +23809,8 @@
           </p:pic>
         </mc:Fallback>
       </mc:AlternateContent>
-      <mc:AlternateContent xmlns:mc="http://schemas.openxmlformats.org/markup-compatibility/2006">
-        <mc:Choice xmlns:p14="http://schemas.microsoft.com/office/powerpoint/2010/main" Requires="p14">
+      <mc:AlternateContent xmlns:mc="http://schemas.openxmlformats.org/markup-compatibility/2006" xmlns:p14="http://schemas.microsoft.com/office/powerpoint/2010/main">
+        <mc:Choice Requires="p14">
           <p:contentPart p14:bwMode="auto" r:id="rId42">
             <p14:nvContentPartPr>
               <p14:cNvPr id="25" name="Ink 24">
@@ -23720,7 +23829,7 @@
             </p14:xfrm>
           </p:contentPart>
         </mc:Choice>
-        <mc:Fallback>
+        <mc:Fallback xmlns="">
           <p:pic>
             <p:nvPicPr>
               <p:cNvPr id="25" name="Ink 24">
@@ -23751,8 +23860,8 @@
           </p:pic>
         </mc:Fallback>
       </mc:AlternateContent>
-      <mc:AlternateContent xmlns:mc="http://schemas.openxmlformats.org/markup-compatibility/2006">
-        <mc:Choice xmlns:p14="http://schemas.microsoft.com/office/powerpoint/2010/main" Requires="p14">
+      <mc:AlternateContent xmlns:mc="http://schemas.openxmlformats.org/markup-compatibility/2006" xmlns:p14="http://schemas.microsoft.com/office/powerpoint/2010/main">
+        <mc:Choice Requires="p14">
           <p:contentPart p14:bwMode="auto" r:id="rId44">
             <p14:nvContentPartPr>
               <p14:cNvPr id="26" name="Ink 25">
@@ -23771,7 +23880,7 @@
             </p14:xfrm>
           </p:contentPart>
         </mc:Choice>
-        <mc:Fallback>
+        <mc:Fallback xmlns="">
           <p:pic>
             <p:nvPicPr>
               <p:cNvPr id="26" name="Ink 25">
@@ -23802,8 +23911,8 @@
           </p:pic>
         </mc:Fallback>
       </mc:AlternateContent>
-      <mc:AlternateContent xmlns:mc="http://schemas.openxmlformats.org/markup-compatibility/2006">
-        <mc:Choice xmlns:p14="http://schemas.microsoft.com/office/powerpoint/2010/main" Requires="p14">
+      <mc:AlternateContent xmlns:mc="http://schemas.openxmlformats.org/markup-compatibility/2006" xmlns:p14="http://schemas.microsoft.com/office/powerpoint/2010/main">
+        <mc:Choice Requires="p14">
           <p:contentPart p14:bwMode="auto" r:id="rId46">
             <p14:nvContentPartPr>
               <p14:cNvPr id="27" name="Ink 26">
@@ -23822,7 +23931,7 @@
             </p14:xfrm>
           </p:contentPart>
         </mc:Choice>
-        <mc:Fallback>
+        <mc:Fallback xmlns="">
           <p:pic>
             <p:nvPicPr>
               <p:cNvPr id="27" name="Ink 26">
@@ -23853,8 +23962,8 @@
           </p:pic>
         </mc:Fallback>
       </mc:AlternateContent>
-      <mc:AlternateContent xmlns:mc="http://schemas.openxmlformats.org/markup-compatibility/2006">
-        <mc:Choice xmlns:p14="http://schemas.microsoft.com/office/powerpoint/2010/main" Requires="p14">
+      <mc:AlternateContent xmlns:mc="http://schemas.openxmlformats.org/markup-compatibility/2006" xmlns:p14="http://schemas.microsoft.com/office/powerpoint/2010/main">
+        <mc:Choice Requires="p14">
           <p:contentPart p14:bwMode="auto" r:id="rId48">
             <p14:nvContentPartPr>
               <p14:cNvPr id="28" name="Ink 27">
@@ -23873,7 +23982,7 @@
             </p14:xfrm>
           </p:contentPart>
         </mc:Choice>
-        <mc:Fallback>
+        <mc:Fallback xmlns="">
           <p:pic>
             <p:nvPicPr>
               <p:cNvPr id="28" name="Ink 27">
@@ -23904,8 +24013,8 @@
           </p:pic>
         </mc:Fallback>
       </mc:AlternateContent>
-      <mc:AlternateContent xmlns:mc="http://schemas.openxmlformats.org/markup-compatibility/2006">
-        <mc:Choice xmlns:p14="http://schemas.microsoft.com/office/powerpoint/2010/main" Requires="p14">
+      <mc:AlternateContent xmlns:mc="http://schemas.openxmlformats.org/markup-compatibility/2006" xmlns:p14="http://schemas.microsoft.com/office/powerpoint/2010/main">
+        <mc:Choice Requires="p14">
           <p:contentPart p14:bwMode="auto" r:id="rId50">
             <p14:nvContentPartPr>
               <p14:cNvPr id="29" name="Ink 28">
@@ -23924,7 +24033,7 @@
             </p14:xfrm>
           </p:contentPart>
         </mc:Choice>
-        <mc:Fallback>
+        <mc:Fallback xmlns="">
           <p:pic>
             <p:nvPicPr>
               <p:cNvPr id="29" name="Ink 28">
@@ -24418,8 +24527,8 @@
           </a:prstGeom>
         </p:spPr>
       </p:pic>
-      <mc:AlternateContent xmlns:mc="http://schemas.openxmlformats.org/markup-compatibility/2006">
-        <mc:Choice xmlns:p14="http://schemas.microsoft.com/office/powerpoint/2010/main" Requires="p14">
+      <mc:AlternateContent xmlns:mc="http://schemas.openxmlformats.org/markup-compatibility/2006" xmlns:p14="http://schemas.microsoft.com/office/powerpoint/2010/main">
+        <mc:Choice Requires="p14">
           <p:contentPart p14:bwMode="auto" r:id="rId4">
             <p14:nvContentPartPr>
               <p14:cNvPr id="5" name="Ink 4">
@@ -24438,7 +24547,7 @@
             </p14:xfrm>
           </p:contentPart>
         </mc:Choice>
-        <mc:Fallback>
+        <mc:Fallback xmlns="">
           <p:pic>
             <p:nvPicPr>
               <p:cNvPr id="5" name="Ink 4">
@@ -24489,8 +24598,8 @@
             <a:chExt cx="2344680" cy="78480"/>
           </a:xfrm>
         </p:grpSpPr>
-        <mc:AlternateContent xmlns:mc="http://schemas.openxmlformats.org/markup-compatibility/2006">
-          <mc:Choice xmlns:p14="http://schemas.microsoft.com/office/powerpoint/2010/main" Requires="p14">
+        <mc:AlternateContent xmlns:mc="http://schemas.openxmlformats.org/markup-compatibility/2006" xmlns:p14="http://schemas.microsoft.com/office/powerpoint/2010/main">
+          <mc:Choice Requires="p14">
             <p:contentPart p14:bwMode="auto" r:id="rId6">
               <p14:nvContentPartPr>
                 <p14:cNvPr id="6" name="Ink 5">
@@ -24509,7 +24618,7 @@
               </p14:xfrm>
             </p:contentPart>
           </mc:Choice>
-          <mc:Fallback>
+          <mc:Fallback xmlns="">
             <p:pic>
               <p:nvPicPr>
                 <p:cNvPr id="6" name="Ink 5">
@@ -24540,8 +24649,8 @@
             </p:pic>
           </mc:Fallback>
         </mc:AlternateContent>
-        <mc:AlternateContent xmlns:mc="http://schemas.openxmlformats.org/markup-compatibility/2006">
-          <mc:Choice xmlns:p14="http://schemas.microsoft.com/office/powerpoint/2010/main" Requires="p14">
+        <mc:AlternateContent xmlns:mc="http://schemas.openxmlformats.org/markup-compatibility/2006" xmlns:p14="http://schemas.microsoft.com/office/powerpoint/2010/main">
+          <mc:Choice Requires="p14">
             <p:contentPart p14:bwMode="auto" r:id="rId8">
               <p14:nvContentPartPr>
                 <p14:cNvPr id="7" name="Ink 6">
@@ -24560,7 +24669,7 @@
               </p14:xfrm>
             </p:contentPart>
           </mc:Choice>
-          <mc:Fallback>
+          <mc:Fallback xmlns="">
             <p:pic>
               <p:nvPicPr>
                 <p:cNvPr id="7" name="Ink 6">
@@ -24592,8 +24701,8 @@
           </mc:Fallback>
         </mc:AlternateContent>
       </p:grpSp>
-      <mc:AlternateContent xmlns:mc="http://schemas.openxmlformats.org/markup-compatibility/2006">
-        <mc:Choice xmlns:p14="http://schemas.microsoft.com/office/powerpoint/2010/main" Requires="p14">
+      <mc:AlternateContent xmlns:mc="http://schemas.openxmlformats.org/markup-compatibility/2006" xmlns:p14="http://schemas.microsoft.com/office/powerpoint/2010/main">
+        <mc:Choice Requires="p14">
           <p:contentPart p14:bwMode="auto" r:id="rId10">
             <p14:nvContentPartPr>
               <p14:cNvPr id="10" name="Ink 9">
@@ -24612,7 +24721,7 @@
             </p14:xfrm>
           </p:contentPart>
         </mc:Choice>
-        <mc:Fallback>
+        <mc:Fallback xmlns="">
           <p:pic>
             <p:nvPicPr>
               <p:cNvPr id="10" name="Ink 9">
@@ -24643,8 +24752,8 @@
           </p:pic>
         </mc:Fallback>
       </mc:AlternateContent>
-      <mc:AlternateContent xmlns:mc="http://schemas.openxmlformats.org/markup-compatibility/2006">
-        <mc:Choice xmlns:p14="http://schemas.microsoft.com/office/powerpoint/2010/main" Requires="p14">
+      <mc:AlternateContent xmlns:mc="http://schemas.openxmlformats.org/markup-compatibility/2006" xmlns:p14="http://schemas.microsoft.com/office/powerpoint/2010/main">
+        <mc:Choice Requires="p14">
           <p:contentPart p14:bwMode="auto" r:id="rId12">
             <p14:nvContentPartPr>
               <p14:cNvPr id="11" name="Ink 10">
@@ -24663,7 +24772,7 @@
             </p14:xfrm>
           </p:contentPart>
         </mc:Choice>
-        <mc:Fallback>
+        <mc:Fallback xmlns="">
           <p:pic>
             <p:nvPicPr>
               <p:cNvPr id="11" name="Ink 10">
@@ -27460,8 +27569,8 @@
           </a:prstGeom>
         </p:spPr>
       </p:pic>
-      <mc:AlternateContent xmlns:mc="http://schemas.openxmlformats.org/markup-compatibility/2006">
-        <mc:Choice xmlns:p14="http://schemas.microsoft.com/office/powerpoint/2010/main" Requires="p14">
+      <mc:AlternateContent xmlns:mc="http://schemas.openxmlformats.org/markup-compatibility/2006" xmlns:p14="http://schemas.microsoft.com/office/powerpoint/2010/main">
+        <mc:Choice Requires="p14">
           <p:contentPart p14:bwMode="auto" r:id="rId4">
             <p14:nvContentPartPr>
               <p14:cNvPr id="5" name="Ink 4">
@@ -27480,7 +27589,7 @@
             </p14:xfrm>
           </p:contentPart>
         </mc:Choice>
-        <mc:Fallback>
+        <mc:Fallback xmlns="">
           <p:pic>
             <p:nvPicPr>
               <p:cNvPr id="5" name="Ink 4">
@@ -27511,8 +27620,8 @@
           </p:pic>
         </mc:Fallback>
       </mc:AlternateContent>
-      <mc:AlternateContent xmlns:mc="http://schemas.openxmlformats.org/markup-compatibility/2006">
-        <mc:Choice xmlns:p14="http://schemas.microsoft.com/office/powerpoint/2010/main" Requires="p14">
+      <mc:AlternateContent xmlns:mc="http://schemas.openxmlformats.org/markup-compatibility/2006" xmlns:p14="http://schemas.microsoft.com/office/powerpoint/2010/main">
+        <mc:Choice Requires="p14">
           <p:contentPart p14:bwMode="auto" r:id="rId6">
             <p14:nvContentPartPr>
               <p14:cNvPr id="6" name="Ink 5">
@@ -27531,7 +27640,7 @@
             </p14:xfrm>
           </p:contentPart>
         </mc:Choice>
-        <mc:Fallback>
+        <mc:Fallback xmlns="">
           <p:pic>
             <p:nvPicPr>
               <p:cNvPr id="6" name="Ink 5">
@@ -27562,8 +27671,8 @@
           </p:pic>
         </mc:Fallback>
       </mc:AlternateContent>
-      <mc:AlternateContent xmlns:mc="http://schemas.openxmlformats.org/markup-compatibility/2006">
-        <mc:Choice xmlns:p14="http://schemas.microsoft.com/office/powerpoint/2010/main" Requires="p14">
+      <mc:AlternateContent xmlns:mc="http://schemas.openxmlformats.org/markup-compatibility/2006" xmlns:p14="http://schemas.microsoft.com/office/powerpoint/2010/main">
+        <mc:Choice Requires="p14">
           <p:contentPart p14:bwMode="auto" r:id="rId8">
             <p14:nvContentPartPr>
               <p14:cNvPr id="7" name="Ink 6">
@@ -27582,7 +27691,7 @@
             </p14:xfrm>
           </p:contentPart>
         </mc:Choice>
-        <mc:Fallback>
+        <mc:Fallback xmlns="">
           <p:pic>
             <p:nvPicPr>
               <p:cNvPr id="7" name="Ink 6">
@@ -27613,8 +27722,8 @@
           </p:pic>
         </mc:Fallback>
       </mc:AlternateContent>
-      <mc:AlternateContent xmlns:mc="http://schemas.openxmlformats.org/markup-compatibility/2006">
-        <mc:Choice xmlns:p14="http://schemas.microsoft.com/office/powerpoint/2010/main" Requires="p14">
+      <mc:AlternateContent xmlns:mc="http://schemas.openxmlformats.org/markup-compatibility/2006" xmlns:p14="http://schemas.microsoft.com/office/powerpoint/2010/main">
+        <mc:Choice Requires="p14">
           <p:contentPart p14:bwMode="auto" r:id="rId10">
             <p14:nvContentPartPr>
               <p14:cNvPr id="8" name="Ink 7">
@@ -27633,7 +27742,7 @@
             </p14:xfrm>
           </p:contentPart>
         </mc:Choice>
-        <mc:Fallback>
+        <mc:Fallback xmlns="">
           <p:pic>
             <p:nvPicPr>
               <p:cNvPr id="8" name="Ink 7">
@@ -27664,8 +27773,8 @@
           </p:pic>
         </mc:Fallback>
       </mc:AlternateContent>
-      <mc:AlternateContent xmlns:mc="http://schemas.openxmlformats.org/markup-compatibility/2006">
-        <mc:Choice xmlns:p14="http://schemas.microsoft.com/office/powerpoint/2010/main" Requires="p14">
+      <mc:AlternateContent xmlns:mc="http://schemas.openxmlformats.org/markup-compatibility/2006" xmlns:p14="http://schemas.microsoft.com/office/powerpoint/2010/main">
+        <mc:Choice Requires="p14">
           <p:contentPart p14:bwMode="auto" r:id="rId12">
             <p14:nvContentPartPr>
               <p14:cNvPr id="9" name="Ink 8">
@@ -27684,7 +27793,7 @@
             </p14:xfrm>
           </p:contentPart>
         </mc:Choice>
-        <mc:Fallback>
+        <mc:Fallback xmlns="">
           <p:pic>
             <p:nvPicPr>
               <p:cNvPr id="9" name="Ink 8">
@@ -27715,8 +27824,8 @@
           </p:pic>
         </mc:Fallback>
       </mc:AlternateContent>
-      <mc:AlternateContent xmlns:mc="http://schemas.openxmlformats.org/markup-compatibility/2006">
-        <mc:Choice xmlns:p14="http://schemas.microsoft.com/office/powerpoint/2010/main" Requires="p14">
+      <mc:AlternateContent xmlns:mc="http://schemas.openxmlformats.org/markup-compatibility/2006" xmlns:p14="http://schemas.microsoft.com/office/powerpoint/2010/main">
+        <mc:Choice Requires="p14">
           <p:contentPart p14:bwMode="auto" r:id="rId14">
             <p14:nvContentPartPr>
               <p14:cNvPr id="10" name="Ink 9">
@@ -27735,7 +27844,7 @@
             </p14:xfrm>
           </p:contentPart>
         </mc:Choice>
-        <mc:Fallback>
+        <mc:Fallback xmlns="">
           <p:pic>
             <p:nvPicPr>
               <p:cNvPr id="10" name="Ink 9">
@@ -27766,8 +27875,8 @@
           </p:pic>
         </mc:Fallback>
       </mc:AlternateContent>
-      <mc:AlternateContent xmlns:mc="http://schemas.openxmlformats.org/markup-compatibility/2006">
-        <mc:Choice xmlns:p14="http://schemas.microsoft.com/office/powerpoint/2010/main" Requires="p14">
+      <mc:AlternateContent xmlns:mc="http://schemas.openxmlformats.org/markup-compatibility/2006" xmlns:p14="http://schemas.microsoft.com/office/powerpoint/2010/main">
+        <mc:Choice Requires="p14">
           <p:contentPart p14:bwMode="auto" r:id="rId16">
             <p14:nvContentPartPr>
               <p14:cNvPr id="12" name="Ink 11">
@@ -27786,7 +27895,7 @@
             </p14:xfrm>
           </p:contentPart>
         </mc:Choice>
-        <mc:Fallback>
+        <mc:Fallback xmlns="">
           <p:pic>
             <p:nvPicPr>
               <p:cNvPr id="12" name="Ink 11">
@@ -27837,8 +27946,8 @@
             <a:chExt cx="328680" cy="91800"/>
           </a:xfrm>
         </p:grpSpPr>
-        <mc:AlternateContent xmlns:mc="http://schemas.openxmlformats.org/markup-compatibility/2006">
-          <mc:Choice xmlns:p14="http://schemas.microsoft.com/office/powerpoint/2010/main" Requires="p14">
+        <mc:AlternateContent xmlns:mc="http://schemas.openxmlformats.org/markup-compatibility/2006" xmlns:p14="http://schemas.microsoft.com/office/powerpoint/2010/main">
+          <mc:Choice Requires="p14">
             <p:contentPart p14:bwMode="auto" r:id="rId18">
               <p14:nvContentPartPr>
                 <p14:cNvPr id="11" name="Ink 10">
@@ -27857,7 +27966,7 @@
               </p14:xfrm>
             </p:contentPart>
           </mc:Choice>
-          <mc:Fallback>
+          <mc:Fallback xmlns="">
             <p:pic>
               <p:nvPicPr>
                 <p:cNvPr id="11" name="Ink 10">
@@ -27888,8 +27997,8 @@
             </p:pic>
           </mc:Fallback>
         </mc:AlternateContent>
-        <mc:AlternateContent xmlns:mc="http://schemas.openxmlformats.org/markup-compatibility/2006">
-          <mc:Choice xmlns:p14="http://schemas.microsoft.com/office/powerpoint/2010/main" Requires="p14">
+        <mc:AlternateContent xmlns:mc="http://schemas.openxmlformats.org/markup-compatibility/2006" xmlns:p14="http://schemas.microsoft.com/office/powerpoint/2010/main">
+          <mc:Choice Requires="p14">
             <p:contentPart p14:bwMode="auto" r:id="rId20">
               <p14:nvContentPartPr>
                 <p14:cNvPr id="13" name="Ink 12">
@@ -27908,7 +28017,7 @@
               </p14:xfrm>
             </p:contentPart>
           </mc:Choice>
-          <mc:Fallback>
+          <mc:Fallback xmlns="">
             <p:pic>
               <p:nvPicPr>
                 <p:cNvPr id="13" name="Ink 12">
@@ -31483,6 +31592,75 @@
               <a:t>(code illustration snippet 79)</a:t>
             </a:r>
           </a:p>
+          <a:p>
+            <a:pPr algn="l"/>
+            <a:endParaRPr lang="en-US" sz="1800">
+              <a:sym typeface="Wingdings" pitchFamily="2" charset="2"/>
+            </a:endParaRPr>
+          </a:p>
+          <a:p>
+            <a:pPr algn="l"/>
+            <a:r>
+              <a:rPr lang="en-US" sz="1800" b="1">
+                <a:sym typeface="Wingdings" pitchFamily="2" charset="2"/>
+              </a:rPr>
+              <a:t>Revise weird case about "protected" access modifier</a:t>
+            </a:r>
+          </a:p>
+          <a:p>
+            <a:pPr algn="l"/>
+            <a:r>
+              <a:rPr lang="en-US" sz="1800">
+                <a:sym typeface="Wingdings" pitchFamily="2" charset="2"/>
+              </a:rPr>
+              <a:t>-) For protected ..., we have ... cases</a:t>
+            </a:r>
+          </a:p>
+          <a:p>
+            <a:pPr algn="l"/>
+            <a:r>
+              <a:rPr lang="en-US" sz="1800">
+                <a:sym typeface="Wingdings" pitchFamily="2" charset="2"/>
+              </a:rPr>
+              <a:t>+)</a:t>
+            </a:r>
+          </a:p>
+          <a:p>
+            <a:pPr algn="l"/>
+            <a:r>
+              <a:rPr lang="en-US" sz="1800">
+                <a:sym typeface="Wingdings" pitchFamily="2" charset="2"/>
+              </a:rPr>
+              <a:t>+) Either ... is satisfied</a:t>
+            </a:r>
+          </a:p>
+          <a:p>
+            <a:pPr algn="l"/>
+            <a:r>
+              <a:rPr lang="en-US" sz="1800">
+                <a:sym typeface="Wingdings" pitchFamily="2" charset="2"/>
+              </a:rPr>
+              <a:t>*) Accessing using ... =&gt; Only ... class</a:t>
+            </a:r>
+          </a:p>
+          <a:p>
+            <a:pPr algn="l"/>
+            <a:r>
+              <a:rPr lang="en-US" sz="1800">
+                <a:sym typeface="Wingdings" pitchFamily="2" charset="2"/>
+              </a:rPr>
+              <a:t>*) Accessing using ... =&gt; The type must be ... or sub of ...</a:t>
+            </a:r>
+          </a:p>
+          <a:p>
+            <a:pPr algn="l"/>
+            <a:r>
+              <a:rPr lang="en-US" sz="1800">
+                <a:sym typeface="Wingdings" pitchFamily="2" charset="2"/>
+              </a:rPr>
+              <a:t>(code illustration snippet 80)</a:t>
+            </a:r>
+          </a:p>
         </p:txBody>
       </p:sp>
     </p:spTree>
@@ -31728,6 +31906,349 @@
                                           <p:spTgt spid="4">
                                             <p:txEl>
                                               <p:pRg st="6" end="6"/>
+                                            </p:txEl>
+                                          </p:spTgt>
+                                        </p:tgtEl>
+                                        <p:attrNameLst>
+                                          <p:attrName>style.visibility</p:attrName>
+                                        </p:attrNameLst>
+                                      </p:cBhvr>
+                                      <p:to>
+                                        <p:strVal val="visible"/>
+                                      </p:to>
+                                    </p:set>
+                                  </p:childTnLst>
+                                </p:cTn>
+                              </p:par>
+                            </p:childTnLst>
+                          </p:cTn>
+                        </p:par>
+                      </p:childTnLst>
+                    </p:cTn>
+                  </p:par>
+                  <p:par>
+                    <p:cTn id="23" fill="hold">
+                      <p:stCondLst>
+                        <p:cond delay="indefinite"/>
+                      </p:stCondLst>
+                      <p:childTnLst>
+                        <p:par>
+                          <p:cTn id="24" fill="hold">
+                            <p:stCondLst>
+                              <p:cond delay="0"/>
+                            </p:stCondLst>
+                            <p:childTnLst>
+                              <p:par>
+                                <p:cTn id="25" presetID="1" presetClass="entr" presetSubtype="0" fill="hold" nodeType="clickEffect">
+                                  <p:stCondLst>
+                                    <p:cond delay="0"/>
+                                  </p:stCondLst>
+                                  <p:childTnLst>
+                                    <p:set>
+                                      <p:cBhvr>
+                                        <p:cTn id="26" dur="1" fill="hold">
+                                          <p:stCondLst>
+                                            <p:cond delay="0"/>
+                                          </p:stCondLst>
+                                        </p:cTn>
+                                        <p:tgtEl>
+                                          <p:spTgt spid="4">
+                                            <p:txEl>
+                                              <p:pRg st="8" end="8"/>
+                                            </p:txEl>
+                                          </p:spTgt>
+                                        </p:tgtEl>
+                                        <p:attrNameLst>
+                                          <p:attrName>style.visibility</p:attrName>
+                                        </p:attrNameLst>
+                                      </p:cBhvr>
+                                      <p:to>
+                                        <p:strVal val="visible"/>
+                                      </p:to>
+                                    </p:set>
+                                  </p:childTnLst>
+                                </p:cTn>
+                              </p:par>
+                            </p:childTnLst>
+                          </p:cTn>
+                        </p:par>
+                      </p:childTnLst>
+                    </p:cTn>
+                  </p:par>
+                  <p:par>
+                    <p:cTn id="27" fill="hold">
+                      <p:stCondLst>
+                        <p:cond delay="indefinite"/>
+                      </p:stCondLst>
+                      <p:childTnLst>
+                        <p:par>
+                          <p:cTn id="28" fill="hold">
+                            <p:stCondLst>
+                              <p:cond delay="0"/>
+                            </p:stCondLst>
+                            <p:childTnLst>
+                              <p:par>
+                                <p:cTn id="29" presetID="1" presetClass="entr" presetSubtype="0" fill="hold" nodeType="clickEffect">
+                                  <p:stCondLst>
+                                    <p:cond delay="0"/>
+                                  </p:stCondLst>
+                                  <p:childTnLst>
+                                    <p:set>
+                                      <p:cBhvr>
+                                        <p:cTn id="30" dur="1" fill="hold">
+                                          <p:stCondLst>
+                                            <p:cond delay="0"/>
+                                          </p:stCondLst>
+                                        </p:cTn>
+                                        <p:tgtEl>
+                                          <p:spTgt spid="4">
+                                            <p:txEl>
+                                              <p:pRg st="9" end="9"/>
+                                            </p:txEl>
+                                          </p:spTgt>
+                                        </p:tgtEl>
+                                        <p:attrNameLst>
+                                          <p:attrName>style.visibility</p:attrName>
+                                        </p:attrNameLst>
+                                      </p:cBhvr>
+                                      <p:to>
+                                        <p:strVal val="visible"/>
+                                      </p:to>
+                                    </p:set>
+                                  </p:childTnLst>
+                                </p:cTn>
+                              </p:par>
+                            </p:childTnLst>
+                          </p:cTn>
+                        </p:par>
+                      </p:childTnLst>
+                    </p:cTn>
+                  </p:par>
+                  <p:par>
+                    <p:cTn id="31" fill="hold">
+                      <p:stCondLst>
+                        <p:cond delay="indefinite"/>
+                      </p:stCondLst>
+                      <p:childTnLst>
+                        <p:par>
+                          <p:cTn id="32" fill="hold">
+                            <p:stCondLst>
+                              <p:cond delay="0"/>
+                            </p:stCondLst>
+                            <p:childTnLst>
+                              <p:par>
+                                <p:cTn id="33" presetID="1" presetClass="entr" presetSubtype="0" fill="hold" nodeType="clickEffect">
+                                  <p:stCondLst>
+                                    <p:cond delay="0"/>
+                                  </p:stCondLst>
+                                  <p:childTnLst>
+                                    <p:set>
+                                      <p:cBhvr>
+                                        <p:cTn id="34" dur="1" fill="hold">
+                                          <p:stCondLst>
+                                            <p:cond delay="0"/>
+                                          </p:stCondLst>
+                                        </p:cTn>
+                                        <p:tgtEl>
+                                          <p:spTgt spid="4">
+                                            <p:txEl>
+                                              <p:pRg st="10" end="10"/>
+                                            </p:txEl>
+                                          </p:spTgt>
+                                        </p:tgtEl>
+                                        <p:attrNameLst>
+                                          <p:attrName>style.visibility</p:attrName>
+                                        </p:attrNameLst>
+                                      </p:cBhvr>
+                                      <p:to>
+                                        <p:strVal val="visible"/>
+                                      </p:to>
+                                    </p:set>
+                                  </p:childTnLst>
+                                </p:cTn>
+                              </p:par>
+                            </p:childTnLst>
+                          </p:cTn>
+                        </p:par>
+                      </p:childTnLst>
+                    </p:cTn>
+                  </p:par>
+                  <p:par>
+                    <p:cTn id="35" fill="hold">
+                      <p:stCondLst>
+                        <p:cond delay="indefinite"/>
+                      </p:stCondLst>
+                      <p:childTnLst>
+                        <p:par>
+                          <p:cTn id="36" fill="hold">
+                            <p:stCondLst>
+                              <p:cond delay="0"/>
+                            </p:stCondLst>
+                            <p:childTnLst>
+                              <p:par>
+                                <p:cTn id="37" presetID="1" presetClass="entr" presetSubtype="0" fill="hold" nodeType="clickEffect">
+                                  <p:stCondLst>
+                                    <p:cond delay="0"/>
+                                  </p:stCondLst>
+                                  <p:childTnLst>
+                                    <p:set>
+                                      <p:cBhvr>
+                                        <p:cTn id="38" dur="1" fill="hold">
+                                          <p:stCondLst>
+                                            <p:cond delay="0"/>
+                                          </p:stCondLst>
+                                        </p:cTn>
+                                        <p:tgtEl>
+                                          <p:spTgt spid="4">
+                                            <p:txEl>
+                                              <p:pRg st="11" end="11"/>
+                                            </p:txEl>
+                                          </p:spTgt>
+                                        </p:tgtEl>
+                                        <p:attrNameLst>
+                                          <p:attrName>style.visibility</p:attrName>
+                                        </p:attrNameLst>
+                                      </p:cBhvr>
+                                      <p:to>
+                                        <p:strVal val="visible"/>
+                                      </p:to>
+                                    </p:set>
+                                  </p:childTnLst>
+                                </p:cTn>
+                              </p:par>
+                            </p:childTnLst>
+                          </p:cTn>
+                        </p:par>
+                      </p:childTnLst>
+                    </p:cTn>
+                  </p:par>
+                  <p:par>
+                    <p:cTn id="39" fill="hold">
+                      <p:stCondLst>
+                        <p:cond delay="indefinite"/>
+                      </p:stCondLst>
+                      <p:childTnLst>
+                        <p:par>
+                          <p:cTn id="40" fill="hold">
+                            <p:stCondLst>
+                              <p:cond delay="0"/>
+                            </p:stCondLst>
+                            <p:childTnLst>
+                              <p:par>
+                                <p:cTn id="41" presetID="1" presetClass="entr" presetSubtype="0" fill="hold" nodeType="clickEffect">
+                                  <p:stCondLst>
+                                    <p:cond delay="0"/>
+                                  </p:stCondLst>
+                                  <p:childTnLst>
+                                    <p:set>
+                                      <p:cBhvr>
+                                        <p:cTn id="42" dur="1" fill="hold">
+                                          <p:stCondLst>
+                                            <p:cond delay="0"/>
+                                          </p:stCondLst>
+                                        </p:cTn>
+                                        <p:tgtEl>
+                                          <p:spTgt spid="4">
+                                            <p:txEl>
+                                              <p:pRg st="12" end="12"/>
+                                            </p:txEl>
+                                          </p:spTgt>
+                                        </p:tgtEl>
+                                        <p:attrNameLst>
+                                          <p:attrName>style.visibility</p:attrName>
+                                        </p:attrNameLst>
+                                      </p:cBhvr>
+                                      <p:to>
+                                        <p:strVal val="visible"/>
+                                      </p:to>
+                                    </p:set>
+                                  </p:childTnLst>
+                                </p:cTn>
+                              </p:par>
+                            </p:childTnLst>
+                          </p:cTn>
+                        </p:par>
+                      </p:childTnLst>
+                    </p:cTn>
+                  </p:par>
+                  <p:par>
+                    <p:cTn id="43" fill="hold">
+                      <p:stCondLst>
+                        <p:cond delay="indefinite"/>
+                      </p:stCondLst>
+                      <p:childTnLst>
+                        <p:par>
+                          <p:cTn id="44" fill="hold">
+                            <p:stCondLst>
+                              <p:cond delay="0"/>
+                            </p:stCondLst>
+                            <p:childTnLst>
+                              <p:par>
+                                <p:cTn id="45" presetID="1" presetClass="entr" presetSubtype="0" fill="hold" nodeType="clickEffect">
+                                  <p:stCondLst>
+                                    <p:cond delay="0"/>
+                                  </p:stCondLst>
+                                  <p:childTnLst>
+                                    <p:set>
+                                      <p:cBhvr>
+                                        <p:cTn id="46" dur="1" fill="hold">
+                                          <p:stCondLst>
+                                            <p:cond delay="0"/>
+                                          </p:stCondLst>
+                                        </p:cTn>
+                                        <p:tgtEl>
+                                          <p:spTgt spid="4">
+                                            <p:txEl>
+                                              <p:pRg st="13" end="13"/>
+                                            </p:txEl>
+                                          </p:spTgt>
+                                        </p:tgtEl>
+                                        <p:attrNameLst>
+                                          <p:attrName>style.visibility</p:attrName>
+                                        </p:attrNameLst>
+                                      </p:cBhvr>
+                                      <p:to>
+                                        <p:strVal val="visible"/>
+                                      </p:to>
+                                    </p:set>
+                                  </p:childTnLst>
+                                </p:cTn>
+                              </p:par>
+                            </p:childTnLst>
+                          </p:cTn>
+                        </p:par>
+                      </p:childTnLst>
+                    </p:cTn>
+                  </p:par>
+                  <p:par>
+                    <p:cTn id="47" fill="hold">
+                      <p:stCondLst>
+                        <p:cond delay="indefinite"/>
+                      </p:stCondLst>
+                      <p:childTnLst>
+                        <p:par>
+                          <p:cTn id="48" fill="hold">
+                            <p:stCondLst>
+                              <p:cond delay="0"/>
+                            </p:stCondLst>
+                            <p:childTnLst>
+                              <p:par>
+                                <p:cTn id="49" presetID="1" presetClass="entr" presetSubtype="0" fill="hold" nodeType="clickEffect">
+                                  <p:stCondLst>
+                                    <p:cond delay="0"/>
+                                  </p:stCondLst>
+                                  <p:childTnLst>
+                                    <p:set>
+                                      <p:cBhvr>
+                                        <p:cTn id="50" dur="1" fill="hold">
+                                          <p:stCondLst>
+                                            <p:cond delay="0"/>
+                                          </p:stCondLst>
+                                        </p:cTn>
+                                        <p:tgtEl>
+                                          <p:spTgt spid="4">
+                                            <p:txEl>
+                                              <p:pRg st="14" end="14"/>
                                             </p:txEl>
                                           </p:spTgt>
                                         </p:tgtEl>
@@ -32658,6 +33179,602 @@
                                           <p:spTgt spid="4">
                                             <p:txEl>
                                               <p:pRg st="14" end="14"/>
+                                            </p:txEl>
+                                          </p:spTgt>
+                                        </p:tgtEl>
+                                        <p:attrNameLst>
+                                          <p:attrName>style.visibility</p:attrName>
+                                        </p:attrNameLst>
+                                      </p:cBhvr>
+                                      <p:to>
+                                        <p:strVal val="visible"/>
+                                      </p:to>
+                                    </p:set>
+                                  </p:childTnLst>
+                                </p:cTn>
+                              </p:par>
+                            </p:childTnLst>
+                          </p:cTn>
+                        </p:par>
+                      </p:childTnLst>
+                    </p:cTn>
+                  </p:par>
+                </p:childTnLst>
+              </p:cTn>
+              <p:prevCondLst>
+                <p:cond evt="onPrev" delay="0">
+                  <p:tgtEl>
+                    <p:sldTgt/>
+                  </p:tgtEl>
+                </p:cond>
+              </p:prevCondLst>
+              <p:nextCondLst>
+                <p:cond evt="onNext" delay="0">
+                  <p:tgtEl>
+                    <p:sldTgt/>
+                  </p:tgtEl>
+                </p:cond>
+              </p:nextCondLst>
+            </p:seq>
+          </p:childTnLst>
+        </p:cTn>
+      </p:par>
+    </p:tnLst>
+  </p:timing>
+</p:sld>
+</file>
+
+<file path=ppt/slides/slide30.xml><?xml version="1.0" encoding="utf-8"?>
+<p:sld xmlns:a="http://schemas.openxmlformats.org/drawingml/2006/main" xmlns:r="http://schemas.openxmlformats.org/officeDocument/2006/relationships" xmlns:p="http://schemas.openxmlformats.org/presentationml/2006/main">
+  <p:cSld>
+    <p:spTree>
+      <p:nvGrpSpPr>
+        <p:cNvPr id="1" name="">
+          <a:extLst>
+            <a:ext uri="{FF2B5EF4-FFF2-40B4-BE49-F238E27FC236}">
+              <a16:creationId xmlns:a16="http://schemas.microsoft.com/office/drawing/2014/main" id="{1AA498B3-6AAF-684C-6A2E-46C84027AC4D}"/>
+            </a:ext>
+          </a:extLst>
+        </p:cNvPr>
+        <p:cNvGrpSpPr/>
+        <p:nvPr/>
+      </p:nvGrpSpPr>
+      <p:grpSpPr>
+        <a:xfrm>
+          <a:off x="0" y="0"/>
+          <a:ext cx="0" cy="0"/>
+          <a:chOff x="0" y="0"/>
+          <a:chExt cx="0" cy="0"/>
+        </a:xfrm>
+      </p:grpSpPr>
+      <p:sp>
+        <p:nvSpPr>
+          <p:cNvPr id="3" name="Subtitle 2">
+            <a:extLst>
+              <a:ext uri="{FF2B5EF4-FFF2-40B4-BE49-F238E27FC236}">
+                <a16:creationId xmlns:a16="http://schemas.microsoft.com/office/drawing/2014/main" id="{AFBE06D4-8414-D54B-D05E-1C7D5A1668F3}"/>
+              </a:ext>
+            </a:extLst>
+          </p:cNvPr>
+          <p:cNvSpPr>
+            <a:spLocks noGrp="1"/>
+          </p:cNvSpPr>
+          <p:nvPr>
+            <p:ph type="subTitle" idx="1"/>
+          </p:nvPr>
+        </p:nvSpPr>
+        <p:spPr>
+          <a:xfrm>
+            <a:off x="152399" y="217488"/>
+            <a:ext cx="11223171" cy="303212"/>
+          </a:xfrm>
+        </p:spPr>
+        <p:txBody>
+          <a:bodyPr>
+            <a:normAutofit fontScale="92500" lnSpcReduction="20000"/>
+          </a:bodyPr>
+          <a:lstStyle/>
+          <a:p>
+            <a:r>
+              <a:rPr lang="en-US" sz="1800" b="1"/>
+              <a:t>New things</a:t>
+            </a:r>
+          </a:p>
+        </p:txBody>
+      </p:sp>
+      <p:sp>
+        <p:nvSpPr>
+          <p:cNvPr id="4" name="Subtitle 2">
+            <a:extLst>
+              <a:ext uri="{FF2B5EF4-FFF2-40B4-BE49-F238E27FC236}">
+                <a16:creationId xmlns:a16="http://schemas.microsoft.com/office/drawing/2014/main" id="{7D66FB57-6B00-F361-C649-8B99FBF4E7E1}"/>
+              </a:ext>
+            </a:extLst>
+          </p:cNvPr>
+          <p:cNvSpPr txBox="1">
+            <a:spLocks/>
+          </p:cNvSpPr>
+          <p:nvPr/>
+        </p:nvSpPr>
+        <p:spPr>
+          <a:xfrm>
+            <a:off x="0" y="820738"/>
+            <a:ext cx="12192000" cy="6037262"/>
+          </a:xfrm>
+          <a:prstGeom prst="rect">
+            <a:avLst/>
+          </a:prstGeom>
+        </p:spPr>
+        <p:txBody>
+          <a:bodyPr vert="horz" lIns="91440" tIns="45720" rIns="91440" bIns="45720" rtlCol="0">
+            <a:normAutofit/>
+          </a:bodyPr>
+          <a:lstStyle>
+            <a:lvl1pPr marL="0" indent="0" algn="ctr" defTabSz="914400" rtl="0" eaLnBrk="1" latinLnBrk="0" hangingPunct="1">
+              <a:lnSpc>
+                <a:spcPct val="90000"/>
+              </a:lnSpc>
+              <a:spcBef>
+                <a:spcPts val="1000"/>
+              </a:spcBef>
+              <a:buFont typeface="Arial" panose="020B0604020202020204" pitchFamily="34" charset="0"/>
+              <a:buNone/>
+              <a:defRPr sz="2400" kern="1200">
+                <a:solidFill>
+                  <a:schemeClr val="tx1"/>
+                </a:solidFill>
+                <a:latin typeface="+mn-lt"/>
+                <a:ea typeface="+mn-ea"/>
+                <a:cs typeface="+mn-cs"/>
+              </a:defRPr>
+            </a:lvl1pPr>
+            <a:lvl2pPr marL="457200" indent="0" algn="ctr" defTabSz="914400" rtl="0" eaLnBrk="1" latinLnBrk="0" hangingPunct="1">
+              <a:lnSpc>
+                <a:spcPct val="90000"/>
+              </a:lnSpc>
+              <a:spcBef>
+                <a:spcPts val="500"/>
+              </a:spcBef>
+              <a:buFont typeface="Arial" panose="020B0604020202020204" pitchFamily="34" charset="0"/>
+              <a:buNone/>
+              <a:defRPr sz="2000" kern="1200">
+                <a:solidFill>
+                  <a:schemeClr val="tx1"/>
+                </a:solidFill>
+                <a:latin typeface="+mn-lt"/>
+                <a:ea typeface="+mn-ea"/>
+                <a:cs typeface="+mn-cs"/>
+              </a:defRPr>
+            </a:lvl2pPr>
+            <a:lvl3pPr marL="914400" indent="0" algn="ctr" defTabSz="914400" rtl="0" eaLnBrk="1" latinLnBrk="0" hangingPunct="1">
+              <a:lnSpc>
+                <a:spcPct val="90000"/>
+              </a:lnSpc>
+              <a:spcBef>
+                <a:spcPts val="500"/>
+              </a:spcBef>
+              <a:buFont typeface="Arial" panose="020B0604020202020204" pitchFamily="34" charset="0"/>
+              <a:buNone/>
+              <a:defRPr sz="1800" kern="1200">
+                <a:solidFill>
+                  <a:schemeClr val="tx1"/>
+                </a:solidFill>
+                <a:latin typeface="+mn-lt"/>
+                <a:ea typeface="+mn-ea"/>
+                <a:cs typeface="+mn-cs"/>
+              </a:defRPr>
+            </a:lvl3pPr>
+            <a:lvl4pPr marL="1371600" indent="0" algn="ctr" defTabSz="914400" rtl="0" eaLnBrk="1" latinLnBrk="0" hangingPunct="1">
+              <a:lnSpc>
+                <a:spcPct val="90000"/>
+              </a:lnSpc>
+              <a:spcBef>
+                <a:spcPts val="500"/>
+              </a:spcBef>
+              <a:buFont typeface="Arial" panose="020B0604020202020204" pitchFamily="34" charset="0"/>
+              <a:buNone/>
+              <a:defRPr sz="1600" kern="1200">
+                <a:solidFill>
+                  <a:schemeClr val="tx1"/>
+                </a:solidFill>
+                <a:latin typeface="+mn-lt"/>
+                <a:ea typeface="+mn-ea"/>
+                <a:cs typeface="+mn-cs"/>
+              </a:defRPr>
+            </a:lvl4pPr>
+            <a:lvl5pPr marL="1828800" indent="0" algn="ctr" defTabSz="914400" rtl="0" eaLnBrk="1" latinLnBrk="0" hangingPunct="1">
+              <a:lnSpc>
+                <a:spcPct val="90000"/>
+              </a:lnSpc>
+              <a:spcBef>
+                <a:spcPts val="500"/>
+              </a:spcBef>
+              <a:buFont typeface="Arial" panose="020B0604020202020204" pitchFamily="34" charset="0"/>
+              <a:buNone/>
+              <a:defRPr sz="1600" kern="1200">
+                <a:solidFill>
+                  <a:schemeClr val="tx1"/>
+                </a:solidFill>
+                <a:latin typeface="+mn-lt"/>
+                <a:ea typeface="+mn-ea"/>
+                <a:cs typeface="+mn-cs"/>
+              </a:defRPr>
+            </a:lvl5pPr>
+            <a:lvl6pPr marL="2286000" indent="0" algn="ctr" defTabSz="914400" rtl="0" eaLnBrk="1" latinLnBrk="0" hangingPunct="1">
+              <a:lnSpc>
+                <a:spcPct val="90000"/>
+              </a:lnSpc>
+              <a:spcBef>
+                <a:spcPts val="500"/>
+              </a:spcBef>
+              <a:buFont typeface="Arial" panose="020B0604020202020204" pitchFamily="34" charset="0"/>
+              <a:buNone/>
+              <a:defRPr sz="1600" kern="1200">
+                <a:solidFill>
+                  <a:schemeClr val="tx1"/>
+                </a:solidFill>
+                <a:latin typeface="+mn-lt"/>
+                <a:ea typeface="+mn-ea"/>
+                <a:cs typeface="+mn-cs"/>
+              </a:defRPr>
+            </a:lvl6pPr>
+            <a:lvl7pPr marL="2743200" indent="0" algn="ctr" defTabSz="914400" rtl="0" eaLnBrk="1" latinLnBrk="0" hangingPunct="1">
+              <a:lnSpc>
+                <a:spcPct val="90000"/>
+              </a:lnSpc>
+              <a:spcBef>
+                <a:spcPts val="500"/>
+              </a:spcBef>
+              <a:buFont typeface="Arial" panose="020B0604020202020204" pitchFamily="34" charset="0"/>
+              <a:buNone/>
+              <a:defRPr sz="1600" kern="1200">
+                <a:solidFill>
+                  <a:schemeClr val="tx1"/>
+                </a:solidFill>
+                <a:latin typeface="+mn-lt"/>
+                <a:ea typeface="+mn-ea"/>
+                <a:cs typeface="+mn-cs"/>
+              </a:defRPr>
+            </a:lvl7pPr>
+            <a:lvl8pPr marL="3200400" indent="0" algn="ctr" defTabSz="914400" rtl="0" eaLnBrk="1" latinLnBrk="0" hangingPunct="1">
+              <a:lnSpc>
+                <a:spcPct val="90000"/>
+              </a:lnSpc>
+              <a:spcBef>
+                <a:spcPts val="500"/>
+              </a:spcBef>
+              <a:buFont typeface="Arial" panose="020B0604020202020204" pitchFamily="34" charset="0"/>
+              <a:buNone/>
+              <a:defRPr sz="1600" kern="1200">
+                <a:solidFill>
+                  <a:schemeClr val="tx1"/>
+                </a:solidFill>
+                <a:latin typeface="+mn-lt"/>
+                <a:ea typeface="+mn-ea"/>
+                <a:cs typeface="+mn-cs"/>
+              </a:defRPr>
+            </a:lvl8pPr>
+            <a:lvl9pPr marL="3657600" indent="0" algn="ctr" defTabSz="914400" rtl="0" eaLnBrk="1" latinLnBrk="0" hangingPunct="1">
+              <a:lnSpc>
+                <a:spcPct val="90000"/>
+              </a:lnSpc>
+              <a:spcBef>
+                <a:spcPts val="500"/>
+              </a:spcBef>
+              <a:buFont typeface="Arial" panose="020B0604020202020204" pitchFamily="34" charset="0"/>
+              <a:buNone/>
+              <a:defRPr sz="1600" kern="1200">
+                <a:solidFill>
+                  <a:schemeClr val="tx1"/>
+                </a:solidFill>
+                <a:latin typeface="+mn-lt"/>
+                <a:ea typeface="+mn-ea"/>
+                <a:cs typeface="+mn-cs"/>
+              </a:defRPr>
+            </a:lvl9pPr>
+          </a:lstStyle>
+          <a:p>
+            <a:pPr algn="l"/>
+            <a:r>
+              <a:rPr lang="en-US" sz="1800" b="1">
+                <a:sym typeface="Wingdings" pitchFamily="2" charset="2"/>
+              </a:rPr>
+              <a:t>Limit of autoboxing and numeric promotion</a:t>
+            </a:r>
+          </a:p>
+          <a:p>
+            <a:pPr algn="l"/>
+            <a:r>
+              <a:rPr lang="en-US" sz="1800">
+                <a:sym typeface="Wingdings" pitchFamily="2" charset="2"/>
+              </a:rPr>
+              <a:t>- We can't do ... and ... at the same ..., we have to do it ...</a:t>
+            </a:r>
+          </a:p>
+          <a:p>
+            <a:pPr algn="l"/>
+            <a:endParaRPr lang="en-US" sz="1800">
+              <a:sym typeface="Wingdings" pitchFamily="2" charset="2"/>
+            </a:endParaRPr>
+          </a:p>
+          <a:p>
+            <a:pPr algn="l"/>
+            <a:r>
+              <a:rPr lang="en-US" sz="1800" b="1">
+                <a:sym typeface="Wingdings" pitchFamily="2" charset="2"/>
+              </a:rPr>
+              <a:t>Method overloading (update for varargs)</a:t>
+            </a:r>
+          </a:p>
+          <a:p>
+            <a:pPr algn="l"/>
+            <a:r>
+              <a:rPr lang="en-US" sz="1800">
+                <a:sym typeface="Wingdings" pitchFamily="2" charset="2"/>
+              </a:rPr>
+              <a:t>- A method with param ... and ... will be considered as the ... because varargs is technically ...</a:t>
+            </a:r>
+          </a:p>
+          <a:p>
+            <a:pPr algn="l"/>
+            <a:r>
+              <a:rPr lang="en-US" sz="1800">
+                <a:sym typeface="Wingdings" pitchFamily="2" charset="2"/>
+              </a:rPr>
+              <a:t>(code illustration snippet 81)</a:t>
+            </a:r>
+          </a:p>
+          <a:p>
+            <a:pPr algn="l"/>
+            <a:endParaRPr lang="en-US" sz="1800">
+              <a:sym typeface="Wingdings" pitchFamily="2" charset="2"/>
+            </a:endParaRPr>
+          </a:p>
+        </p:txBody>
+      </p:sp>
+    </p:spTree>
+    <p:extLst>
+      <p:ext uri="{BB962C8B-B14F-4D97-AF65-F5344CB8AC3E}">
+        <p14:creationId xmlns:p14="http://schemas.microsoft.com/office/powerpoint/2010/main" val="2326245410"/>
+      </p:ext>
+    </p:extLst>
+  </p:cSld>
+  <p:clrMapOvr>
+    <a:masterClrMapping/>
+  </p:clrMapOvr>
+  <p:timing>
+    <p:tnLst>
+      <p:par>
+        <p:cTn id="1" dur="indefinite" restart="never" nodeType="tmRoot">
+          <p:childTnLst>
+            <p:seq concurrent="1" nextAc="seek">
+              <p:cTn id="2" dur="indefinite" nodeType="mainSeq">
+                <p:childTnLst>
+                  <p:par>
+                    <p:cTn id="3" fill="hold">
+                      <p:stCondLst>
+                        <p:cond delay="indefinite"/>
+                      </p:stCondLst>
+                      <p:childTnLst>
+                        <p:par>
+                          <p:cTn id="4" fill="hold">
+                            <p:stCondLst>
+                              <p:cond delay="0"/>
+                            </p:stCondLst>
+                            <p:childTnLst>
+                              <p:par>
+                                <p:cTn id="5" presetID="1" presetClass="entr" presetSubtype="0" fill="hold" nodeType="clickEffect">
+                                  <p:stCondLst>
+                                    <p:cond delay="0"/>
+                                  </p:stCondLst>
+                                  <p:childTnLst>
+                                    <p:set>
+                                      <p:cBhvr>
+                                        <p:cTn id="6" dur="1" fill="hold">
+                                          <p:stCondLst>
+                                            <p:cond delay="0"/>
+                                          </p:stCondLst>
+                                        </p:cTn>
+                                        <p:tgtEl>
+                                          <p:spTgt spid="4">
+                                            <p:txEl>
+                                              <p:pRg st="0" end="0"/>
+                                            </p:txEl>
+                                          </p:spTgt>
+                                        </p:tgtEl>
+                                        <p:attrNameLst>
+                                          <p:attrName>style.visibility</p:attrName>
+                                        </p:attrNameLst>
+                                      </p:cBhvr>
+                                      <p:to>
+                                        <p:strVal val="visible"/>
+                                      </p:to>
+                                    </p:set>
+                                  </p:childTnLst>
+                                </p:cTn>
+                              </p:par>
+                            </p:childTnLst>
+                          </p:cTn>
+                        </p:par>
+                      </p:childTnLst>
+                    </p:cTn>
+                  </p:par>
+                  <p:par>
+                    <p:cTn id="7" fill="hold">
+                      <p:stCondLst>
+                        <p:cond delay="indefinite"/>
+                      </p:stCondLst>
+                      <p:childTnLst>
+                        <p:par>
+                          <p:cTn id="8" fill="hold">
+                            <p:stCondLst>
+                              <p:cond delay="0"/>
+                            </p:stCondLst>
+                            <p:childTnLst>
+                              <p:par>
+                                <p:cTn id="9" presetID="1" presetClass="entr" presetSubtype="0" fill="hold" nodeType="clickEffect">
+                                  <p:stCondLst>
+                                    <p:cond delay="0"/>
+                                  </p:stCondLst>
+                                  <p:childTnLst>
+                                    <p:set>
+                                      <p:cBhvr>
+                                        <p:cTn id="10" dur="1" fill="hold">
+                                          <p:stCondLst>
+                                            <p:cond delay="0"/>
+                                          </p:stCondLst>
+                                        </p:cTn>
+                                        <p:tgtEl>
+                                          <p:spTgt spid="4">
+                                            <p:txEl>
+                                              <p:pRg st="1" end="1"/>
+                                            </p:txEl>
+                                          </p:spTgt>
+                                        </p:tgtEl>
+                                        <p:attrNameLst>
+                                          <p:attrName>style.visibility</p:attrName>
+                                        </p:attrNameLst>
+                                      </p:cBhvr>
+                                      <p:to>
+                                        <p:strVal val="visible"/>
+                                      </p:to>
+                                    </p:set>
+                                  </p:childTnLst>
+                                </p:cTn>
+                              </p:par>
+                            </p:childTnLst>
+                          </p:cTn>
+                        </p:par>
+                      </p:childTnLst>
+                    </p:cTn>
+                  </p:par>
+                  <p:par>
+                    <p:cTn id="11" fill="hold">
+                      <p:stCondLst>
+                        <p:cond delay="indefinite"/>
+                      </p:stCondLst>
+                      <p:childTnLst>
+                        <p:par>
+                          <p:cTn id="12" fill="hold">
+                            <p:stCondLst>
+                              <p:cond delay="0"/>
+                            </p:stCondLst>
+                            <p:childTnLst>
+                              <p:par>
+                                <p:cTn id="13" presetID="1" presetClass="entr" presetSubtype="0" fill="hold" nodeType="clickEffect">
+                                  <p:stCondLst>
+                                    <p:cond delay="0"/>
+                                  </p:stCondLst>
+                                  <p:childTnLst>
+                                    <p:set>
+                                      <p:cBhvr>
+                                        <p:cTn id="14" dur="1" fill="hold">
+                                          <p:stCondLst>
+                                            <p:cond delay="0"/>
+                                          </p:stCondLst>
+                                        </p:cTn>
+                                        <p:tgtEl>
+                                          <p:spTgt spid="4">
+                                            <p:txEl>
+                                              <p:pRg st="3" end="3"/>
+                                            </p:txEl>
+                                          </p:spTgt>
+                                        </p:tgtEl>
+                                        <p:attrNameLst>
+                                          <p:attrName>style.visibility</p:attrName>
+                                        </p:attrNameLst>
+                                      </p:cBhvr>
+                                      <p:to>
+                                        <p:strVal val="visible"/>
+                                      </p:to>
+                                    </p:set>
+                                  </p:childTnLst>
+                                </p:cTn>
+                              </p:par>
+                            </p:childTnLst>
+                          </p:cTn>
+                        </p:par>
+                      </p:childTnLst>
+                    </p:cTn>
+                  </p:par>
+                  <p:par>
+                    <p:cTn id="15" fill="hold">
+                      <p:stCondLst>
+                        <p:cond delay="indefinite"/>
+                      </p:stCondLst>
+                      <p:childTnLst>
+                        <p:par>
+                          <p:cTn id="16" fill="hold">
+                            <p:stCondLst>
+                              <p:cond delay="0"/>
+                            </p:stCondLst>
+                            <p:childTnLst>
+                              <p:par>
+                                <p:cTn id="17" presetID="1" presetClass="entr" presetSubtype="0" fill="hold" nodeType="clickEffect">
+                                  <p:stCondLst>
+                                    <p:cond delay="0"/>
+                                  </p:stCondLst>
+                                  <p:childTnLst>
+                                    <p:set>
+                                      <p:cBhvr>
+                                        <p:cTn id="18" dur="1" fill="hold">
+                                          <p:stCondLst>
+                                            <p:cond delay="0"/>
+                                          </p:stCondLst>
+                                        </p:cTn>
+                                        <p:tgtEl>
+                                          <p:spTgt spid="4">
+                                            <p:txEl>
+                                              <p:pRg st="4" end="4"/>
+                                            </p:txEl>
+                                          </p:spTgt>
+                                        </p:tgtEl>
+                                        <p:attrNameLst>
+                                          <p:attrName>style.visibility</p:attrName>
+                                        </p:attrNameLst>
+                                      </p:cBhvr>
+                                      <p:to>
+                                        <p:strVal val="visible"/>
+                                      </p:to>
+                                    </p:set>
+                                  </p:childTnLst>
+                                </p:cTn>
+                              </p:par>
+                            </p:childTnLst>
+                          </p:cTn>
+                        </p:par>
+                      </p:childTnLst>
+                    </p:cTn>
+                  </p:par>
+                  <p:par>
+                    <p:cTn id="19" fill="hold">
+                      <p:stCondLst>
+                        <p:cond delay="indefinite"/>
+                      </p:stCondLst>
+                      <p:childTnLst>
+                        <p:par>
+                          <p:cTn id="20" fill="hold">
+                            <p:stCondLst>
+                              <p:cond delay="0"/>
+                            </p:stCondLst>
+                            <p:childTnLst>
+                              <p:par>
+                                <p:cTn id="21" presetID="1" presetClass="entr" presetSubtype="0" fill="hold" nodeType="clickEffect">
+                                  <p:stCondLst>
+                                    <p:cond delay="0"/>
+                                  </p:stCondLst>
+                                  <p:childTnLst>
+                                    <p:set>
+                                      <p:cBhvr>
+                                        <p:cTn id="22" dur="1" fill="hold">
+                                          <p:stCondLst>
+                                            <p:cond delay="0"/>
+                                          </p:stCondLst>
+                                        </p:cTn>
+                                        <p:tgtEl>
+                                          <p:spTgt spid="4">
+                                            <p:txEl>
+                                              <p:pRg st="5" end="5"/>
                                             </p:txEl>
                                           </p:spTgt>
                                         </p:tgtEl>

</xml_diff>